<commit_message>
Completed the Zone and Private Cluster topics
</commit_message>
<xml_diff>
--- a/AKS_06_Observability.pptx
+++ b/AKS_06_Observability.pptx
@@ -10,10 +10,10 @@
   <p:sldIdLst>
     <p:sldId id="256" r:id="rId2"/>
     <p:sldId id="282" r:id="rId3"/>
-    <p:sldId id="279" r:id="rId4"/>
-    <p:sldId id="366" r:id="rId5"/>
-    <p:sldId id="368" r:id="rId6"/>
-    <p:sldId id="367" r:id="rId7"/>
+    <p:sldId id="366" r:id="rId4"/>
+    <p:sldId id="368" r:id="rId5"/>
+    <p:sldId id="367" r:id="rId6"/>
+    <p:sldId id="279" r:id="rId7"/>
     <p:sldId id="369" r:id="rId8"/>
     <p:sldId id="334" r:id="rId9"/>
     <p:sldId id="335" r:id="rId10"/>
@@ -136,12 +136,12 @@
   <pc:docChgLst>
     <pc:chgData name="faik bilgen" userId="9fcb1696e65a161f" providerId="LiveId" clId="{0C3A4C9E-717D-4ADE-97E0-B0AD580B3355}"/>
     <pc:docChg chg="undo custSel addSld delSld modSld sldOrd">
-      <pc:chgData name="faik bilgen" userId="9fcb1696e65a161f" providerId="LiveId" clId="{0C3A4C9E-717D-4ADE-97E0-B0AD580B3355}" dt="2026-01-20T14:32:55.779" v="5788" actId="47"/>
+      <pc:chgData name="faik bilgen" userId="9fcb1696e65a161f" providerId="LiveId" clId="{0C3A4C9E-717D-4ADE-97E0-B0AD580B3355}" dt="2026-02-01T11:40:50.413" v="5790"/>
       <pc:docMkLst>
         <pc:docMk/>
       </pc:docMkLst>
       <pc:sldChg chg="modSp add mod ord modNotesTx">
-        <pc:chgData name="faik bilgen" userId="9fcb1696e65a161f" providerId="LiveId" clId="{0C3A4C9E-717D-4ADE-97E0-B0AD580B3355}" dt="2026-01-20T08:57:00.492" v="5631" actId="20577"/>
+        <pc:chgData name="faik bilgen" userId="9fcb1696e65a161f" providerId="LiveId" clId="{0C3A4C9E-717D-4ADE-97E0-B0AD580B3355}" dt="2026-02-01T11:40:50.413" v="5790"/>
         <pc:sldMkLst>
           <pc:docMk/>
           <pc:sldMk cId="2540744057" sldId="279"/>
@@ -169,349 +169,6 @@
             <ac:spMk id="2" creationId="{DD27CCCF-AE7A-25E7-BFFF-0DA25929D339}"/>
           </ac:spMkLst>
         </pc:spChg>
-      </pc:sldChg>
-      <pc:sldChg chg="modSp del mod">
-        <pc:chgData name="faik bilgen" userId="9fcb1696e65a161f" providerId="LiveId" clId="{0C3A4C9E-717D-4ADE-97E0-B0AD580B3355}" dt="2026-01-20T08:57:27.367" v="5632" actId="47"/>
-        <pc:sldMkLst>
-          <pc:docMk/>
-          <pc:sldMk cId="1827053775" sldId="283"/>
-        </pc:sldMkLst>
-      </pc:sldChg>
-      <pc:sldChg chg="del">
-        <pc:chgData name="faik bilgen" userId="9fcb1696e65a161f" providerId="LiveId" clId="{0C3A4C9E-717D-4ADE-97E0-B0AD580B3355}" dt="2026-01-19T08:30:12.240" v="4976" actId="47"/>
-        <pc:sldMkLst>
-          <pc:docMk/>
-          <pc:sldMk cId="1280037439" sldId="284"/>
-        </pc:sldMkLst>
-      </pc:sldChg>
-      <pc:sldChg chg="modSp del mod">
-        <pc:chgData name="faik bilgen" userId="9fcb1696e65a161f" providerId="LiveId" clId="{0C3A4C9E-717D-4ADE-97E0-B0AD580B3355}" dt="2026-01-19T08:30:12.240" v="4976" actId="47"/>
-        <pc:sldMkLst>
-          <pc:docMk/>
-          <pc:sldMk cId="413130814" sldId="285"/>
-        </pc:sldMkLst>
-      </pc:sldChg>
-      <pc:sldChg chg="del">
-        <pc:chgData name="faik bilgen" userId="9fcb1696e65a161f" providerId="LiveId" clId="{0C3A4C9E-717D-4ADE-97E0-B0AD580B3355}" dt="2026-01-19T08:30:12.240" v="4976" actId="47"/>
-        <pc:sldMkLst>
-          <pc:docMk/>
-          <pc:sldMk cId="3038040624" sldId="286"/>
-        </pc:sldMkLst>
-      </pc:sldChg>
-      <pc:sldChg chg="del">
-        <pc:chgData name="faik bilgen" userId="9fcb1696e65a161f" providerId="LiveId" clId="{0C3A4C9E-717D-4ADE-97E0-B0AD580B3355}" dt="2026-01-19T08:30:12.240" v="4976" actId="47"/>
-        <pc:sldMkLst>
-          <pc:docMk/>
-          <pc:sldMk cId="3043854610" sldId="287"/>
-        </pc:sldMkLst>
-      </pc:sldChg>
-      <pc:sldChg chg="del">
-        <pc:chgData name="faik bilgen" userId="9fcb1696e65a161f" providerId="LiveId" clId="{0C3A4C9E-717D-4ADE-97E0-B0AD580B3355}" dt="2026-01-19T08:30:12.240" v="4976" actId="47"/>
-        <pc:sldMkLst>
-          <pc:docMk/>
-          <pc:sldMk cId="2666904521" sldId="288"/>
-        </pc:sldMkLst>
-      </pc:sldChg>
-      <pc:sldChg chg="del">
-        <pc:chgData name="faik bilgen" userId="9fcb1696e65a161f" providerId="LiveId" clId="{0C3A4C9E-717D-4ADE-97E0-B0AD580B3355}" dt="2026-01-19T08:30:12.240" v="4976" actId="47"/>
-        <pc:sldMkLst>
-          <pc:docMk/>
-          <pc:sldMk cId="4201830527" sldId="289"/>
-        </pc:sldMkLst>
-      </pc:sldChg>
-      <pc:sldChg chg="del">
-        <pc:chgData name="faik bilgen" userId="9fcb1696e65a161f" providerId="LiveId" clId="{0C3A4C9E-717D-4ADE-97E0-B0AD580B3355}" dt="2026-01-19T08:30:12.240" v="4976" actId="47"/>
-        <pc:sldMkLst>
-          <pc:docMk/>
-          <pc:sldMk cId="2001816398" sldId="290"/>
-        </pc:sldMkLst>
-      </pc:sldChg>
-      <pc:sldChg chg="del">
-        <pc:chgData name="faik bilgen" userId="9fcb1696e65a161f" providerId="LiveId" clId="{0C3A4C9E-717D-4ADE-97E0-B0AD580B3355}" dt="2026-01-19T08:30:12.240" v="4976" actId="47"/>
-        <pc:sldMkLst>
-          <pc:docMk/>
-          <pc:sldMk cId="3701918185" sldId="292"/>
-        </pc:sldMkLst>
-      </pc:sldChg>
-      <pc:sldChg chg="del">
-        <pc:chgData name="faik bilgen" userId="9fcb1696e65a161f" providerId="LiveId" clId="{0C3A4C9E-717D-4ADE-97E0-B0AD580B3355}" dt="2026-01-19T08:30:12.240" v="4976" actId="47"/>
-        <pc:sldMkLst>
-          <pc:docMk/>
-          <pc:sldMk cId="903027820" sldId="293"/>
-        </pc:sldMkLst>
-      </pc:sldChg>
-      <pc:sldChg chg="del">
-        <pc:chgData name="faik bilgen" userId="9fcb1696e65a161f" providerId="LiveId" clId="{0C3A4C9E-717D-4ADE-97E0-B0AD580B3355}" dt="2026-01-19T08:30:12.240" v="4976" actId="47"/>
-        <pc:sldMkLst>
-          <pc:docMk/>
-          <pc:sldMk cId="1985601365" sldId="294"/>
-        </pc:sldMkLst>
-      </pc:sldChg>
-      <pc:sldChg chg="del">
-        <pc:chgData name="faik bilgen" userId="9fcb1696e65a161f" providerId="LiveId" clId="{0C3A4C9E-717D-4ADE-97E0-B0AD580B3355}" dt="2026-01-19T08:30:12.240" v="4976" actId="47"/>
-        <pc:sldMkLst>
-          <pc:docMk/>
-          <pc:sldMk cId="1779925364" sldId="295"/>
-        </pc:sldMkLst>
-      </pc:sldChg>
-      <pc:sldChg chg="del">
-        <pc:chgData name="faik bilgen" userId="9fcb1696e65a161f" providerId="LiveId" clId="{0C3A4C9E-717D-4ADE-97E0-B0AD580B3355}" dt="2026-01-19T08:30:12.240" v="4976" actId="47"/>
-        <pc:sldMkLst>
-          <pc:docMk/>
-          <pc:sldMk cId="2337829577" sldId="296"/>
-        </pc:sldMkLst>
-      </pc:sldChg>
-      <pc:sldChg chg="del">
-        <pc:chgData name="faik bilgen" userId="9fcb1696e65a161f" providerId="LiveId" clId="{0C3A4C9E-717D-4ADE-97E0-B0AD580B3355}" dt="2026-01-19T08:30:12.240" v="4976" actId="47"/>
-        <pc:sldMkLst>
-          <pc:docMk/>
-          <pc:sldMk cId="2758371294" sldId="297"/>
-        </pc:sldMkLst>
-      </pc:sldChg>
-      <pc:sldChg chg="del">
-        <pc:chgData name="faik bilgen" userId="9fcb1696e65a161f" providerId="LiveId" clId="{0C3A4C9E-717D-4ADE-97E0-B0AD580B3355}" dt="2026-01-19T08:30:12.240" v="4976" actId="47"/>
-        <pc:sldMkLst>
-          <pc:docMk/>
-          <pc:sldMk cId="827202394" sldId="298"/>
-        </pc:sldMkLst>
-      </pc:sldChg>
-      <pc:sldChg chg="addSp delSp modSp add del mod ord">
-        <pc:chgData name="faik bilgen" userId="9fcb1696e65a161f" providerId="LiveId" clId="{0C3A4C9E-717D-4ADE-97E0-B0AD580B3355}" dt="2026-01-19T08:30:12.240" v="4976" actId="47"/>
-        <pc:sldMkLst>
-          <pc:docMk/>
-          <pc:sldMk cId="2895140611" sldId="299"/>
-        </pc:sldMkLst>
-      </pc:sldChg>
-      <pc:sldChg chg="addSp modSp add del mod ord">
-        <pc:chgData name="faik bilgen" userId="9fcb1696e65a161f" providerId="LiveId" clId="{0C3A4C9E-717D-4ADE-97E0-B0AD580B3355}" dt="2026-01-19T08:30:12.240" v="4976" actId="47"/>
-        <pc:sldMkLst>
-          <pc:docMk/>
-          <pc:sldMk cId="3092654538" sldId="300"/>
-        </pc:sldMkLst>
-      </pc:sldChg>
-      <pc:sldChg chg="addSp modSp add del mod">
-        <pc:chgData name="faik bilgen" userId="9fcb1696e65a161f" providerId="LiveId" clId="{0C3A4C9E-717D-4ADE-97E0-B0AD580B3355}" dt="2026-01-19T08:30:12.240" v="4976" actId="47"/>
-        <pc:sldMkLst>
-          <pc:docMk/>
-          <pc:sldMk cId="4067351338" sldId="301"/>
-        </pc:sldMkLst>
-      </pc:sldChg>
-      <pc:sldChg chg="addSp delSp modSp add del mod">
-        <pc:chgData name="faik bilgen" userId="9fcb1696e65a161f" providerId="LiveId" clId="{0C3A4C9E-717D-4ADE-97E0-B0AD580B3355}" dt="2026-01-19T08:30:12.240" v="4976" actId="47"/>
-        <pc:sldMkLst>
-          <pc:docMk/>
-          <pc:sldMk cId="583957781" sldId="302"/>
-        </pc:sldMkLst>
-      </pc:sldChg>
-      <pc:sldChg chg="delSp modSp add del mod">
-        <pc:chgData name="faik bilgen" userId="9fcb1696e65a161f" providerId="LiveId" clId="{0C3A4C9E-717D-4ADE-97E0-B0AD580B3355}" dt="2026-01-19T08:30:12.240" v="4976" actId="47"/>
-        <pc:sldMkLst>
-          <pc:docMk/>
-          <pc:sldMk cId="3950170324" sldId="303"/>
-        </pc:sldMkLst>
-      </pc:sldChg>
-      <pc:sldChg chg="addSp delSp modSp add del mod">
-        <pc:chgData name="faik bilgen" userId="9fcb1696e65a161f" providerId="LiveId" clId="{0C3A4C9E-717D-4ADE-97E0-B0AD580B3355}" dt="2026-01-19T08:30:12.240" v="4976" actId="47"/>
-        <pc:sldMkLst>
-          <pc:docMk/>
-          <pc:sldMk cId="2540071051" sldId="304"/>
-        </pc:sldMkLst>
-      </pc:sldChg>
-      <pc:sldChg chg="addSp delSp modSp add del mod">
-        <pc:chgData name="faik bilgen" userId="9fcb1696e65a161f" providerId="LiveId" clId="{0C3A4C9E-717D-4ADE-97E0-B0AD580B3355}" dt="2026-01-19T08:30:12.240" v="4976" actId="47"/>
-        <pc:sldMkLst>
-          <pc:docMk/>
-          <pc:sldMk cId="165835781" sldId="305"/>
-        </pc:sldMkLst>
-      </pc:sldChg>
-      <pc:sldChg chg="modSp new del mod">
-        <pc:chgData name="faik bilgen" userId="9fcb1696e65a161f" providerId="LiveId" clId="{0C3A4C9E-717D-4ADE-97E0-B0AD580B3355}" dt="2026-01-19T08:30:12.240" v="4976" actId="47"/>
-        <pc:sldMkLst>
-          <pc:docMk/>
-          <pc:sldMk cId="3058817951" sldId="306"/>
-        </pc:sldMkLst>
-      </pc:sldChg>
-      <pc:sldChg chg="modSp add del mod">
-        <pc:chgData name="faik bilgen" userId="9fcb1696e65a161f" providerId="LiveId" clId="{0C3A4C9E-717D-4ADE-97E0-B0AD580B3355}" dt="2026-01-19T08:30:12.240" v="4976" actId="47"/>
-        <pc:sldMkLst>
-          <pc:docMk/>
-          <pc:sldMk cId="2278978057" sldId="307"/>
-        </pc:sldMkLst>
-      </pc:sldChg>
-      <pc:sldChg chg="modSp add del mod ord">
-        <pc:chgData name="faik bilgen" userId="9fcb1696e65a161f" providerId="LiveId" clId="{0C3A4C9E-717D-4ADE-97E0-B0AD580B3355}" dt="2026-01-19T08:30:12.240" v="4976" actId="47"/>
-        <pc:sldMkLst>
-          <pc:docMk/>
-          <pc:sldMk cId="4056952954" sldId="308"/>
-        </pc:sldMkLst>
-      </pc:sldChg>
-      <pc:sldChg chg="addSp delSp modSp add del mod ord">
-        <pc:chgData name="faik bilgen" userId="9fcb1696e65a161f" providerId="LiveId" clId="{0C3A4C9E-717D-4ADE-97E0-B0AD580B3355}" dt="2026-01-19T08:30:12.240" v="4976" actId="47"/>
-        <pc:sldMkLst>
-          <pc:docMk/>
-          <pc:sldMk cId="1816987502" sldId="309"/>
-        </pc:sldMkLst>
-      </pc:sldChg>
-      <pc:sldChg chg="modSp add del mod">
-        <pc:chgData name="faik bilgen" userId="9fcb1696e65a161f" providerId="LiveId" clId="{0C3A4C9E-717D-4ADE-97E0-B0AD580B3355}" dt="2026-01-19T08:30:12.240" v="4976" actId="47"/>
-        <pc:sldMkLst>
-          <pc:docMk/>
-          <pc:sldMk cId="3225331830" sldId="310"/>
-        </pc:sldMkLst>
-      </pc:sldChg>
-      <pc:sldChg chg="addSp modSp add del mod">
-        <pc:chgData name="faik bilgen" userId="9fcb1696e65a161f" providerId="LiveId" clId="{0C3A4C9E-717D-4ADE-97E0-B0AD580B3355}" dt="2026-01-19T08:30:12.240" v="4976" actId="47"/>
-        <pc:sldMkLst>
-          <pc:docMk/>
-          <pc:sldMk cId="1400754023" sldId="311"/>
-        </pc:sldMkLst>
-      </pc:sldChg>
-      <pc:sldChg chg="modSp add del mod">
-        <pc:chgData name="faik bilgen" userId="9fcb1696e65a161f" providerId="LiveId" clId="{0C3A4C9E-717D-4ADE-97E0-B0AD580B3355}" dt="2026-01-19T08:30:12.240" v="4976" actId="47"/>
-        <pc:sldMkLst>
-          <pc:docMk/>
-          <pc:sldMk cId="1349980952" sldId="312"/>
-        </pc:sldMkLst>
-      </pc:sldChg>
-      <pc:sldChg chg="delSp modSp add del mod">
-        <pc:chgData name="faik bilgen" userId="9fcb1696e65a161f" providerId="LiveId" clId="{0C3A4C9E-717D-4ADE-97E0-B0AD580B3355}" dt="2026-01-19T08:30:12.240" v="4976" actId="47"/>
-        <pc:sldMkLst>
-          <pc:docMk/>
-          <pc:sldMk cId="101886985" sldId="313"/>
-        </pc:sldMkLst>
-      </pc:sldChg>
-      <pc:sldChg chg="delSp modSp add del mod">
-        <pc:chgData name="faik bilgen" userId="9fcb1696e65a161f" providerId="LiveId" clId="{0C3A4C9E-717D-4ADE-97E0-B0AD580B3355}" dt="2026-01-19T08:30:12.240" v="4976" actId="47"/>
-        <pc:sldMkLst>
-          <pc:docMk/>
-          <pc:sldMk cId="1302287135" sldId="314"/>
-        </pc:sldMkLst>
-      </pc:sldChg>
-      <pc:sldChg chg="delSp modSp add del mod ord">
-        <pc:chgData name="faik bilgen" userId="9fcb1696e65a161f" providerId="LiveId" clId="{0C3A4C9E-717D-4ADE-97E0-B0AD580B3355}" dt="2026-01-19T08:30:12.240" v="4976" actId="47"/>
-        <pc:sldMkLst>
-          <pc:docMk/>
-          <pc:sldMk cId="3907425655" sldId="315"/>
-        </pc:sldMkLst>
-      </pc:sldChg>
-      <pc:sldChg chg="addSp delSp modSp add del mod">
-        <pc:chgData name="faik bilgen" userId="9fcb1696e65a161f" providerId="LiveId" clId="{0C3A4C9E-717D-4ADE-97E0-B0AD580B3355}" dt="2026-01-19T08:30:12.240" v="4976" actId="47"/>
-        <pc:sldMkLst>
-          <pc:docMk/>
-          <pc:sldMk cId="3575770827" sldId="316"/>
-        </pc:sldMkLst>
-      </pc:sldChg>
-      <pc:sldChg chg="addSp delSp modSp add del mod">
-        <pc:chgData name="faik bilgen" userId="9fcb1696e65a161f" providerId="LiveId" clId="{0C3A4C9E-717D-4ADE-97E0-B0AD580B3355}" dt="2026-01-19T08:30:12.240" v="4976" actId="47"/>
-        <pc:sldMkLst>
-          <pc:docMk/>
-          <pc:sldMk cId="3596573651" sldId="317"/>
-        </pc:sldMkLst>
-      </pc:sldChg>
-      <pc:sldChg chg="modSp add del mod">
-        <pc:chgData name="faik bilgen" userId="9fcb1696e65a161f" providerId="LiveId" clId="{0C3A4C9E-717D-4ADE-97E0-B0AD580B3355}" dt="2026-01-19T08:30:12.240" v="4976" actId="47"/>
-        <pc:sldMkLst>
-          <pc:docMk/>
-          <pc:sldMk cId="186061912" sldId="318"/>
-        </pc:sldMkLst>
-      </pc:sldChg>
-      <pc:sldChg chg="modSp add del mod ord">
-        <pc:chgData name="faik bilgen" userId="9fcb1696e65a161f" providerId="LiveId" clId="{0C3A4C9E-717D-4ADE-97E0-B0AD580B3355}" dt="2026-01-19T08:30:12.240" v="4976" actId="47"/>
-        <pc:sldMkLst>
-          <pc:docMk/>
-          <pc:sldMk cId="3228626609" sldId="319"/>
-        </pc:sldMkLst>
-      </pc:sldChg>
-      <pc:sldChg chg="add del">
-        <pc:chgData name="faik bilgen" userId="9fcb1696e65a161f" providerId="LiveId" clId="{0C3A4C9E-717D-4ADE-97E0-B0AD580B3355}" dt="2026-01-19T08:30:12.240" v="4976" actId="47"/>
-        <pc:sldMkLst>
-          <pc:docMk/>
-          <pc:sldMk cId="2519155230" sldId="320"/>
-        </pc:sldMkLst>
-      </pc:sldChg>
-      <pc:sldChg chg="modSp add del mod ord">
-        <pc:chgData name="faik bilgen" userId="9fcb1696e65a161f" providerId="LiveId" clId="{0C3A4C9E-717D-4ADE-97E0-B0AD580B3355}" dt="2026-01-19T08:30:12.240" v="4976" actId="47"/>
-        <pc:sldMkLst>
-          <pc:docMk/>
-          <pc:sldMk cId="1623904069" sldId="321"/>
-        </pc:sldMkLst>
-      </pc:sldChg>
-      <pc:sldChg chg="addSp delSp modSp new del mod setBg">
-        <pc:chgData name="faik bilgen" userId="9fcb1696e65a161f" providerId="LiveId" clId="{0C3A4C9E-717D-4ADE-97E0-B0AD580B3355}" dt="2026-01-19T08:30:12.240" v="4976" actId="47"/>
-        <pc:sldMkLst>
-          <pc:docMk/>
-          <pc:sldMk cId="2699443842" sldId="322"/>
-        </pc:sldMkLst>
-      </pc:sldChg>
-      <pc:sldChg chg="addSp delSp modSp add del mod addAnim delAnim">
-        <pc:chgData name="faik bilgen" userId="9fcb1696e65a161f" providerId="LiveId" clId="{0C3A4C9E-717D-4ADE-97E0-B0AD580B3355}" dt="2026-01-19T08:30:12.240" v="4976" actId="47"/>
-        <pc:sldMkLst>
-          <pc:docMk/>
-          <pc:sldMk cId="815583536" sldId="323"/>
-        </pc:sldMkLst>
-      </pc:sldChg>
-      <pc:sldChg chg="addSp delSp modSp new del mod">
-        <pc:chgData name="faik bilgen" userId="9fcb1696e65a161f" providerId="LiveId" clId="{0C3A4C9E-717D-4ADE-97E0-B0AD580B3355}" dt="2026-01-19T08:30:12.240" v="4976" actId="47"/>
-        <pc:sldMkLst>
-          <pc:docMk/>
-          <pc:sldMk cId="4116732816" sldId="324"/>
-        </pc:sldMkLst>
-      </pc:sldChg>
-      <pc:sldChg chg="modSp add del mod">
-        <pc:chgData name="faik bilgen" userId="9fcb1696e65a161f" providerId="LiveId" clId="{0C3A4C9E-717D-4ADE-97E0-B0AD580B3355}" dt="2026-01-19T08:30:12.240" v="4976" actId="47"/>
-        <pc:sldMkLst>
-          <pc:docMk/>
-          <pc:sldMk cId="3698575162" sldId="325"/>
-        </pc:sldMkLst>
-      </pc:sldChg>
-      <pc:sldChg chg="modSp add del mod">
-        <pc:chgData name="faik bilgen" userId="9fcb1696e65a161f" providerId="LiveId" clId="{0C3A4C9E-717D-4ADE-97E0-B0AD580B3355}" dt="2026-01-19T08:30:12.240" v="4976" actId="47"/>
-        <pc:sldMkLst>
-          <pc:docMk/>
-          <pc:sldMk cId="2449768822" sldId="326"/>
-        </pc:sldMkLst>
-      </pc:sldChg>
-      <pc:sldChg chg="addSp delSp modSp add del mod">
-        <pc:chgData name="faik bilgen" userId="9fcb1696e65a161f" providerId="LiveId" clId="{0C3A4C9E-717D-4ADE-97E0-B0AD580B3355}" dt="2026-01-19T08:30:12.240" v="4976" actId="47"/>
-        <pc:sldMkLst>
-          <pc:docMk/>
-          <pc:sldMk cId="1258146300" sldId="327"/>
-        </pc:sldMkLst>
-      </pc:sldChg>
-      <pc:sldChg chg="addSp delSp modSp add del mod">
-        <pc:chgData name="faik bilgen" userId="9fcb1696e65a161f" providerId="LiveId" clId="{0C3A4C9E-717D-4ADE-97E0-B0AD580B3355}" dt="2026-01-19T08:30:12.240" v="4976" actId="47"/>
-        <pc:sldMkLst>
-          <pc:docMk/>
-          <pc:sldMk cId="992742952" sldId="328"/>
-        </pc:sldMkLst>
-      </pc:sldChg>
-      <pc:sldChg chg="add del">
-        <pc:chgData name="faik bilgen" userId="9fcb1696e65a161f" providerId="LiveId" clId="{0C3A4C9E-717D-4ADE-97E0-B0AD580B3355}" dt="2026-01-19T08:30:12.240" v="4976" actId="47"/>
-        <pc:sldMkLst>
-          <pc:docMk/>
-          <pc:sldMk cId="2074219807" sldId="329"/>
-        </pc:sldMkLst>
-      </pc:sldChg>
-      <pc:sldChg chg="addSp delSp modSp add del mod">
-        <pc:chgData name="faik bilgen" userId="9fcb1696e65a161f" providerId="LiveId" clId="{0C3A4C9E-717D-4ADE-97E0-B0AD580B3355}" dt="2026-01-19T08:30:12.240" v="4976" actId="47"/>
-        <pc:sldMkLst>
-          <pc:docMk/>
-          <pc:sldMk cId="413828327" sldId="330"/>
-        </pc:sldMkLst>
-      </pc:sldChg>
-      <pc:sldChg chg="addSp delSp modSp add del mod">
-        <pc:chgData name="faik bilgen" userId="9fcb1696e65a161f" providerId="LiveId" clId="{0C3A4C9E-717D-4ADE-97E0-B0AD580B3355}" dt="2026-01-19T08:30:12.240" v="4976" actId="47"/>
-        <pc:sldMkLst>
-          <pc:docMk/>
-          <pc:sldMk cId="3049912915" sldId="331"/>
-        </pc:sldMkLst>
-      </pc:sldChg>
-      <pc:sldChg chg="addSp delSp modSp new del mod">
-        <pc:chgData name="faik bilgen" userId="9fcb1696e65a161f" providerId="LiveId" clId="{0C3A4C9E-717D-4ADE-97E0-B0AD580B3355}" dt="2026-01-19T08:30:12.240" v="4976" actId="47"/>
-        <pc:sldMkLst>
-          <pc:docMk/>
-          <pc:sldMk cId="4037468409" sldId="333"/>
-        </pc:sldMkLst>
       </pc:sldChg>
       <pc:sldChg chg="addSp delSp modSp new mod setBg">
         <pc:chgData name="faik bilgen" userId="9fcb1696e65a161f" providerId="LiveId" clId="{0C3A4C9E-717D-4ADE-97E0-B0AD580B3355}" dt="2026-01-17T12:38:38.133" v="4157" actId="26606"/>
@@ -567,505 +224,6 @@
           </ac:spMkLst>
         </pc:spChg>
       </pc:sldChg>
-      <pc:sldChg chg="modSp add del mod ord">
-        <pc:chgData name="faik bilgen" userId="9fcb1696e65a161f" providerId="LiveId" clId="{0C3A4C9E-717D-4ADE-97E0-B0AD580B3355}" dt="2026-01-19T08:30:12.240" v="4976" actId="47"/>
-        <pc:sldMkLst>
-          <pc:docMk/>
-          <pc:sldMk cId="3793066071" sldId="336"/>
-        </pc:sldMkLst>
-      </pc:sldChg>
-      <pc:sldChg chg="modSp add del mod">
-        <pc:chgData name="faik bilgen" userId="9fcb1696e65a161f" providerId="LiveId" clId="{0C3A4C9E-717D-4ADE-97E0-B0AD580B3355}" dt="2026-01-20T08:57:27.367" v="5632" actId="47"/>
-        <pc:sldMkLst>
-          <pc:docMk/>
-          <pc:sldMk cId="1027240615" sldId="337"/>
-        </pc:sldMkLst>
-      </pc:sldChg>
-      <pc:sldChg chg="addSp delSp modSp add del mod">
-        <pc:chgData name="faik bilgen" userId="9fcb1696e65a161f" providerId="LiveId" clId="{0C3A4C9E-717D-4ADE-97E0-B0AD580B3355}" dt="2026-01-20T08:57:27.367" v="5632" actId="47"/>
-        <pc:sldMkLst>
-          <pc:docMk/>
-          <pc:sldMk cId="3728687266" sldId="338"/>
-        </pc:sldMkLst>
-      </pc:sldChg>
-      <pc:sldChg chg="addSp delSp modSp new del mod setBg">
-        <pc:chgData name="faik bilgen" userId="9fcb1696e65a161f" providerId="LiveId" clId="{0C3A4C9E-717D-4ADE-97E0-B0AD580B3355}" dt="2026-01-20T08:57:27.367" v="5632" actId="47"/>
-        <pc:sldMkLst>
-          <pc:docMk/>
-          <pc:sldMk cId="1338012161" sldId="340"/>
-        </pc:sldMkLst>
-      </pc:sldChg>
-      <pc:sldChg chg="addSp delSp modSp new del mod setBg addAnim">
-        <pc:chgData name="faik bilgen" userId="9fcb1696e65a161f" providerId="LiveId" clId="{0C3A4C9E-717D-4ADE-97E0-B0AD580B3355}" dt="2026-01-20T08:57:27.367" v="5632" actId="47"/>
-        <pc:sldMkLst>
-          <pc:docMk/>
-          <pc:sldMk cId="3293302071" sldId="342"/>
-        </pc:sldMkLst>
-      </pc:sldChg>
-      <pc:sldChg chg="addSp delSp modSp add del mod ord">
-        <pc:chgData name="faik bilgen" userId="9fcb1696e65a161f" providerId="LiveId" clId="{0C3A4C9E-717D-4ADE-97E0-B0AD580B3355}" dt="2026-01-20T08:57:27.367" v="5632" actId="47"/>
-        <pc:sldMkLst>
-          <pc:docMk/>
-          <pc:sldMk cId="725342305" sldId="343"/>
-        </pc:sldMkLst>
-      </pc:sldChg>
-      <pc:sldChg chg="addSp delSp modSp add del mod">
-        <pc:chgData name="faik bilgen" userId="9fcb1696e65a161f" providerId="LiveId" clId="{0C3A4C9E-717D-4ADE-97E0-B0AD580B3355}" dt="2026-01-20T08:57:27.367" v="5632" actId="47"/>
-        <pc:sldMkLst>
-          <pc:docMk/>
-          <pc:sldMk cId="4208932202" sldId="344"/>
-        </pc:sldMkLst>
-      </pc:sldChg>
-      <pc:sldChg chg="addSp delSp modSp add del mod">
-        <pc:chgData name="faik bilgen" userId="9fcb1696e65a161f" providerId="LiveId" clId="{0C3A4C9E-717D-4ADE-97E0-B0AD580B3355}" dt="2026-01-20T08:57:27.367" v="5632" actId="47"/>
-        <pc:sldMkLst>
-          <pc:docMk/>
-          <pc:sldMk cId="660422530" sldId="345"/>
-        </pc:sldMkLst>
-      </pc:sldChg>
-      <pc:sldChg chg="addSp delSp modSp add del mod">
-        <pc:chgData name="faik bilgen" userId="9fcb1696e65a161f" providerId="LiveId" clId="{0C3A4C9E-717D-4ADE-97E0-B0AD580B3355}" dt="2026-01-20T08:57:27.367" v="5632" actId="47"/>
-        <pc:sldMkLst>
-          <pc:docMk/>
-          <pc:sldMk cId="3331747759" sldId="346"/>
-        </pc:sldMkLst>
-      </pc:sldChg>
-      <pc:sldChg chg="addSp delSp modSp add del mod">
-        <pc:chgData name="faik bilgen" userId="9fcb1696e65a161f" providerId="LiveId" clId="{0C3A4C9E-717D-4ADE-97E0-B0AD580B3355}" dt="2026-01-20T08:57:27.367" v="5632" actId="47"/>
-        <pc:sldMkLst>
-          <pc:docMk/>
-          <pc:sldMk cId="3545184821" sldId="347"/>
-        </pc:sldMkLst>
-      </pc:sldChg>
-      <pc:sldChg chg="add del">
-        <pc:chgData name="faik bilgen" userId="9fcb1696e65a161f" providerId="LiveId" clId="{0C3A4C9E-717D-4ADE-97E0-B0AD580B3355}" dt="2026-01-19T08:30:12.240" v="4976" actId="47"/>
-        <pc:sldMkLst>
-          <pc:docMk/>
-          <pc:sldMk cId="757455787" sldId="348"/>
-        </pc:sldMkLst>
-      </pc:sldChg>
-      <pc:sldChg chg="addSp delSp modSp new del mod setBg">
-        <pc:chgData name="faik bilgen" userId="9fcb1696e65a161f" providerId="LiveId" clId="{0C3A4C9E-717D-4ADE-97E0-B0AD580B3355}" dt="2026-01-20T14:32:55.779" v="5788" actId="47"/>
-        <pc:sldMkLst>
-          <pc:docMk/>
-          <pc:sldMk cId="3131274016" sldId="349"/>
-        </pc:sldMkLst>
-      </pc:sldChg>
-      <pc:sldChg chg="modSp add del mod ord">
-        <pc:chgData name="faik bilgen" userId="9fcb1696e65a161f" providerId="LiveId" clId="{0C3A4C9E-717D-4ADE-97E0-B0AD580B3355}" dt="2026-01-20T14:32:55.779" v="5788" actId="47"/>
-        <pc:sldMkLst>
-          <pc:docMk/>
-          <pc:sldMk cId="694935753" sldId="350"/>
-        </pc:sldMkLst>
-        <pc:spChg chg="mod">
-          <ac:chgData name="faik bilgen" userId="9fcb1696e65a161f" providerId="LiveId" clId="{0C3A4C9E-717D-4ADE-97E0-B0AD580B3355}" dt="2026-01-19T08:30:41.291" v="5004" actId="20577"/>
-          <ac:spMkLst>
-            <pc:docMk/>
-            <pc:sldMk cId="694935753" sldId="350"/>
-            <ac:spMk id="2" creationId="{E815B1F9-1A96-BEBB-3AFB-11C6D3E74BFB}"/>
-          </ac:spMkLst>
-        </pc:spChg>
-      </pc:sldChg>
-      <pc:sldChg chg="modSp add del mod ord modNotesTx">
-        <pc:chgData name="faik bilgen" userId="9fcb1696e65a161f" providerId="LiveId" clId="{0C3A4C9E-717D-4ADE-97E0-B0AD580B3355}" dt="2026-01-20T14:32:55.779" v="5788" actId="47"/>
-        <pc:sldMkLst>
-          <pc:docMk/>
-          <pc:sldMk cId="1943525955" sldId="351"/>
-        </pc:sldMkLst>
-        <pc:spChg chg="mod">
-          <ac:chgData name="faik bilgen" userId="9fcb1696e65a161f" providerId="LiveId" clId="{0C3A4C9E-717D-4ADE-97E0-B0AD580B3355}" dt="2026-01-19T08:34:42.786" v="5021" actId="20577"/>
-          <ac:spMkLst>
-            <pc:docMk/>
-            <pc:sldMk cId="1943525955" sldId="351"/>
-            <ac:spMk id="2" creationId="{A7C72ECC-5817-3BC3-CAC7-F7DD858BF1BB}"/>
-          </ac:spMkLst>
-        </pc:spChg>
-        <pc:spChg chg="mod">
-          <ac:chgData name="faik bilgen" userId="9fcb1696e65a161f" providerId="LiveId" clId="{0C3A4C9E-717D-4ADE-97E0-B0AD580B3355}" dt="2026-01-19T08:42:45.117" v="5101" actId="1036"/>
-          <ac:spMkLst>
-            <pc:docMk/>
-            <pc:sldMk cId="1943525955" sldId="351"/>
-            <ac:spMk id="5" creationId="{2CE0DF66-6242-2523-C6BD-189FBDE76F9C}"/>
-          </ac:spMkLst>
-        </pc:spChg>
-      </pc:sldChg>
-      <pc:sldChg chg="modSp add del mod modNotesTx">
-        <pc:chgData name="faik bilgen" userId="9fcb1696e65a161f" providerId="LiveId" clId="{0C3A4C9E-717D-4ADE-97E0-B0AD580B3355}" dt="2026-01-20T14:32:55.779" v="5788" actId="47"/>
-        <pc:sldMkLst>
-          <pc:docMk/>
-          <pc:sldMk cId="31476329" sldId="352"/>
-        </pc:sldMkLst>
-        <pc:spChg chg="mod">
-          <ac:chgData name="faik bilgen" userId="9fcb1696e65a161f" providerId="LiveId" clId="{0C3A4C9E-717D-4ADE-97E0-B0AD580B3355}" dt="2026-01-19T08:39:10.265" v="5046" actId="20577"/>
-          <ac:spMkLst>
-            <pc:docMk/>
-            <pc:sldMk cId="31476329" sldId="352"/>
-            <ac:spMk id="2" creationId="{6DD73244-415D-1E68-2BC3-7944B43AEF25}"/>
-          </ac:spMkLst>
-        </pc:spChg>
-        <pc:spChg chg="mod">
-          <ac:chgData name="faik bilgen" userId="9fcb1696e65a161f" providerId="LiveId" clId="{0C3A4C9E-717D-4ADE-97E0-B0AD580B3355}" dt="2026-01-19T08:42:39.567" v="5088" actId="1036"/>
-          <ac:spMkLst>
-            <pc:docMk/>
-            <pc:sldMk cId="31476329" sldId="352"/>
-            <ac:spMk id="5" creationId="{BDD22AB8-9347-F997-4926-1151CE27FC93}"/>
-          </ac:spMkLst>
-        </pc:spChg>
-      </pc:sldChg>
-      <pc:sldChg chg="modSp add del mod">
-        <pc:chgData name="faik bilgen" userId="9fcb1696e65a161f" providerId="LiveId" clId="{0C3A4C9E-717D-4ADE-97E0-B0AD580B3355}" dt="2026-01-20T14:32:55.779" v="5788" actId="47"/>
-        <pc:sldMkLst>
-          <pc:docMk/>
-          <pc:sldMk cId="2748666702" sldId="353"/>
-        </pc:sldMkLst>
-        <pc:spChg chg="mod">
-          <ac:chgData name="faik bilgen" userId="9fcb1696e65a161f" providerId="LiveId" clId="{0C3A4C9E-717D-4ADE-97E0-B0AD580B3355}" dt="2026-01-19T08:40:18.737" v="5058" actId="20577"/>
-          <ac:spMkLst>
-            <pc:docMk/>
-            <pc:sldMk cId="2748666702" sldId="353"/>
-            <ac:spMk id="2" creationId="{2CFAF51A-E526-0A71-1402-88AE146C1C05}"/>
-          </ac:spMkLst>
-        </pc:spChg>
-        <pc:spChg chg="mod">
-          <ac:chgData name="faik bilgen" userId="9fcb1696e65a161f" providerId="LiveId" clId="{0C3A4C9E-717D-4ADE-97E0-B0AD580B3355}" dt="2026-01-19T08:42:32.467" v="5077" actId="1036"/>
-          <ac:spMkLst>
-            <pc:docMk/>
-            <pc:sldMk cId="2748666702" sldId="353"/>
-            <ac:spMk id="5" creationId="{3A20040C-9D0D-FBC1-5C0C-81B85D27ED0A}"/>
-          </ac:spMkLst>
-        </pc:spChg>
-      </pc:sldChg>
-      <pc:sldChg chg="modSp add del mod modNotesTx">
-        <pc:chgData name="faik bilgen" userId="9fcb1696e65a161f" providerId="LiveId" clId="{0C3A4C9E-717D-4ADE-97E0-B0AD580B3355}" dt="2026-01-20T14:32:55.779" v="5788" actId="47"/>
-        <pc:sldMkLst>
-          <pc:docMk/>
-          <pc:sldMk cId="457470317" sldId="354"/>
-        </pc:sldMkLst>
-        <pc:spChg chg="mod">
-          <ac:chgData name="faik bilgen" userId="9fcb1696e65a161f" providerId="LiveId" clId="{0C3A4C9E-717D-4ADE-97E0-B0AD580B3355}" dt="2026-01-19T08:42:51.829" v="5109" actId="20577"/>
-          <ac:spMkLst>
-            <pc:docMk/>
-            <pc:sldMk cId="457470317" sldId="354"/>
-            <ac:spMk id="2" creationId="{B3AF5AF1-97BC-0B3E-C481-F63DF4FC92FE}"/>
-          </ac:spMkLst>
-        </pc:spChg>
-        <pc:spChg chg="mod">
-          <ac:chgData name="faik bilgen" userId="9fcb1696e65a161f" providerId="LiveId" clId="{0C3A4C9E-717D-4ADE-97E0-B0AD580B3355}" dt="2026-01-19T08:43:53.335" v="5123" actId="14100"/>
-          <ac:spMkLst>
-            <pc:docMk/>
-            <pc:sldMk cId="457470317" sldId="354"/>
-            <ac:spMk id="5" creationId="{25A57006-ADBE-F5AA-4E04-3185D74D844D}"/>
-          </ac:spMkLst>
-        </pc:spChg>
-      </pc:sldChg>
-      <pc:sldChg chg="modSp add del mod">
-        <pc:chgData name="faik bilgen" userId="9fcb1696e65a161f" providerId="LiveId" clId="{0C3A4C9E-717D-4ADE-97E0-B0AD580B3355}" dt="2026-01-20T14:32:55.779" v="5788" actId="47"/>
-        <pc:sldMkLst>
-          <pc:docMk/>
-          <pc:sldMk cId="4275599633" sldId="355"/>
-        </pc:sldMkLst>
-        <pc:spChg chg="mod">
-          <ac:chgData name="faik bilgen" userId="9fcb1696e65a161f" providerId="LiveId" clId="{0C3A4C9E-717D-4ADE-97E0-B0AD580B3355}" dt="2026-01-19T08:46:33.697" v="5136" actId="20577"/>
-          <ac:spMkLst>
-            <pc:docMk/>
-            <pc:sldMk cId="4275599633" sldId="355"/>
-            <ac:spMk id="2" creationId="{A0EC7264-E972-D17B-8715-77C42B8E5E0E}"/>
-          </ac:spMkLst>
-        </pc:spChg>
-        <pc:spChg chg="mod">
-          <ac:chgData name="faik bilgen" userId="9fcb1696e65a161f" providerId="LiveId" clId="{0C3A4C9E-717D-4ADE-97E0-B0AD580B3355}" dt="2026-01-19T08:47:04.892" v="5138"/>
-          <ac:spMkLst>
-            <pc:docMk/>
-            <pc:sldMk cId="4275599633" sldId="355"/>
-            <ac:spMk id="5" creationId="{E0762854-9D1C-A13C-B22B-E8745BEB7227}"/>
-          </ac:spMkLst>
-        </pc:spChg>
-      </pc:sldChg>
-      <pc:sldChg chg="modSp add del mod ord">
-        <pc:chgData name="faik bilgen" userId="9fcb1696e65a161f" providerId="LiveId" clId="{0C3A4C9E-717D-4ADE-97E0-B0AD580B3355}" dt="2026-01-20T14:32:55.779" v="5788" actId="47"/>
-        <pc:sldMkLst>
-          <pc:docMk/>
-          <pc:sldMk cId="2433606623" sldId="356"/>
-        </pc:sldMkLst>
-        <pc:spChg chg="mod">
-          <ac:chgData name="faik bilgen" userId="9fcb1696e65a161f" providerId="LiveId" clId="{0C3A4C9E-717D-4ADE-97E0-B0AD580B3355}" dt="2026-01-19T12:09:47.513" v="5202" actId="20577"/>
-          <ac:spMkLst>
-            <pc:docMk/>
-            <pc:sldMk cId="2433606623" sldId="356"/>
-            <ac:spMk id="3" creationId="{0BA872B3-F8E5-9FB3-0731-5C7DF1418BCA}"/>
-          </ac:spMkLst>
-        </pc:spChg>
-      </pc:sldChg>
-      <pc:sldChg chg="addSp modSp add del mod ord modNotesTx">
-        <pc:chgData name="faik bilgen" userId="9fcb1696e65a161f" providerId="LiveId" clId="{0C3A4C9E-717D-4ADE-97E0-B0AD580B3355}" dt="2026-01-20T14:32:55.779" v="5788" actId="47"/>
-        <pc:sldMkLst>
-          <pc:docMk/>
-          <pc:sldMk cId="3871461859" sldId="357"/>
-        </pc:sldMkLst>
-        <pc:spChg chg="mod">
-          <ac:chgData name="faik bilgen" userId="9fcb1696e65a161f" providerId="LiveId" clId="{0C3A4C9E-717D-4ADE-97E0-B0AD580B3355}" dt="2026-01-19T12:43:23.586" v="5206"/>
-          <ac:spMkLst>
-            <pc:docMk/>
-            <pc:sldMk cId="3871461859" sldId="357"/>
-            <ac:spMk id="2" creationId="{77A4DA1B-1F5A-1943-49B1-E0EE88B37672}"/>
-          </ac:spMkLst>
-        </pc:spChg>
-        <pc:spChg chg="mod">
-          <ac:chgData name="faik bilgen" userId="9fcb1696e65a161f" providerId="LiveId" clId="{0C3A4C9E-717D-4ADE-97E0-B0AD580B3355}" dt="2026-01-19T12:45:36.510" v="5239" actId="552"/>
-          <ac:spMkLst>
-            <pc:docMk/>
-            <pc:sldMk cId="3871461859" sldId="357"/>
-            <ac:spMk id="5" creationId="{6480673C-DBFD-EDAD-1BFF-9190037FAC9E}"/>
-          </ac:spMkLst>
-        </pc:spChg>
-        <pc:graphicFrameChg chg="add mod modGraphic">
-          <ac:chgData name="faik bilgen" userId="9fcb1696e65a161f" providerId="LiveId" clId="{0C3A4C9E-717D-4ADE-97E0-B0AD580B3355}" dt="2026-01-19T12:45:36.510" v="5239" actId="552"/>
-          <ac:graphicFrameMkLst>
-            <pc:docMk/>
-            <pc:sldMk cId="3871461859" sldId="357"/>
-            <ac:graphicFrameMk id="3" creationId="{2DC7441C-1AD8-365A-2446-85D2611DB8DE}"/>
-          </ac:graphicFrameMkLst>
-        </pc:graphicFrameChg>
-      </pc:sldChg>
-      <pc:sldChg chg="delSp modSp add del mod">
-        <pc:chgData name="faik bilgen" userId="9fcb1696e65a161f" providerId="LiveId" clId="{0C3A4C9E-717D-4ADE-97E0-B0AD580B3355}" dt="2026-01-20T14:32:55.779" v="5788" actId="47"/>
-        <pc:sldMkLst>
-          <pc:docMk/>
-          <pc:sldMk cId="376929427" sldId="358"/>
-        </pc:sldMkLst>
-        <pc:spChg chg="mod">
-          <ac:chgData name="faik bilgen" userId="9fcb1696e65a161f" providerId="LiveId" clId="{0C3A4C9E-717D-4ADE-97E0-B0AD580B3355}" dt="2026-01-19T12:46:45.550" v="5263" actId="20577"/>
-          <ac:spMkLst>
-            <pc:docMk/>
-            <pc:sldMk cId="376929427" sldId="358"/>
-            <ac:spMk id="2" creationId="{84D7D15D-5A8B-93CA-E765-5097B2C90E8E}"/>
-          </ac:spMkLst>
-        </pc:spChg>
-        <pc:spChg chg="mod">
-          <ac:chgData name="faik bilgen" userId="9fcb1696e65a161f" providerId="LiveId" clId="{0C3A4C9E-717D-4ADE-97E0-B0AD580B3355}" dt="2026-01-19T12:49:29.815" v="5315" actId="1036"/>
-          <ac:spMkLst>
-            <pc:docMk/>
-            <pc:sldMk cId="376929427" sldId="358"/>
-            <ac:spMk id="5" creationId="{D6C67AB8-B85D-91AE-BE05-3BA13B92FC18}"/>
-          </ac:spMkLst>
-        </pc:spChg>
-        <pc:graphicFrameChg chg="del">
-          <ac:chgData name="faik bilgen" userId="9fcb1696e65a161f" providerId="LiveId" clId="{0C3A4C9E-717D-4ADE-97E0-B0AD580B3355}" dt="2026-01-19T12:46:49.508" v="5264" actId="478"/>
-          <ac:graphicFrameMkLst>
-            <pc:docMk/>
-            <pc:sldMk cId="376929427" sldId="358"/>
-            <ac:graphicFrameMk id="3" creationId="{5B2C6001-0F42-D634-07D1-F34C1B00E4AC}"/>
-          </ac:graphicFrameMkLst>
-        </pc:graphicFrameChg>
-      </pc:sldChg>
-      <pc:sldChg chg="modSp add del mod">
-        <pc:chgData name="faik bilgen" userId="9fcb1696e65a161f" providerId="LiveId" clId="{0C3A4C9E-717D-4ADE-97E0-B0AD580B3355}" dt="2026-01-20T14:32:55.779" v="5788" actId="47"/>
-        <pc:sldMkLst>
-          <pc:docMk/>
-          <pc:sldMk cId="2140530945" sldId="359"/>
-        </pc:sldMkLst>
-        <pc:spChg chg="mod">
-          <ac:chgData name="faik bilgen" userId="9fcb1696e65a161f" providerId="LiveId" clId="{0C3A4C9E-717D-4ADE-97E0-B0AD580B3355}" dt="2026-01-19T12:48:11.379" v="5282" actId="20577"/>
-          <ac:spMkLst>
-            <pc:docMk/>
-            <pc:sldMk cId="2140530945" sldId="359"/>
-            <ac:spMk id="2" creationId="{8B2D8E11-E12A-C650-317C-1A33289350D7}"/>
-          </ac:spMkLst>
-        </pc:spChg>
-        <pc:spChg chg="mod">
-          <ac:chgData name="faik bilgen" userId="9fcb1696e65a161f" providerId="LiveId" clId="{0C3A4C9E-717D-4ADE-97E0-B0AD580B3355}" dt="2026-01-19T12:49:38.990" v="5334" actId="1036"/>
-          <ac:spMkLst>
-            <pc:docMk/>
-            <pc:sldMk cId="2140530945" sldId="359"/>
-            <ac:spMk id="5" creationId="{644FBEED-1F8B-AC54-B2E0-15F272B9CBDD}"/>
-          </ac:spMkLst>
-        </pc:spChg>
-      </pc:sldChg>
-      <pc:sldChg chg="modSp add del mod modNotesTx">
-        <pc:chgData name="faik bilgen" userId="9fcb1696e65a161f" providerId="LiveId" clId="{0C3A4C9E-717D-4ADE-97E0-B0AD580B3355}" dt="2026-01-20T14:32:55.779" v="5788" actId="47"/>
-        <pc:sldMkLst>
-          <pc:docMk/>
-          <pc:sldMk cId="2064698615" sldId="360"/>
-        </pc:sldMkLst>
-        <pc:spChg chg="mod">
-          <ac:chgData name="faik bilgen" userId="9fcb1696e65a161f" providerId="LiveId" clId="{0C3A4C9E-717D-4ADE-97E0-B0AD580B3355}" dt="2026-01-19T12:49:02.459" v="5296" actId="20577"/>
-          <ac:spMkLst>
-            <pc:docMk/>
-            <pc:sldMk cId="2064698615" sldId="360"/>
-            <ac:spMk id="2" creationId="{83A320DC-D331-853A-8517-C0B4F91500FB}"/>
-          </ac:spMkLst>
-        </pc:spChg>
-        <pc:spChg chg="mod">
-          <ac:chgData name="faik bilgen" userId="9fcb1696e65a161f" providerId="LiveId" clId="{0C3A4C9E-717D-4ADE-97E0-B0AD580B3355}" dt="2026-01-19T12:49:47.433" v="5352" actId="1036"/>
-          <ac:spMkLst>
-            <pc:docMk/>
-            <pc:sldMk cId="2064698615" sldId="360"/>
-            <ac:spMk id="5" creationId="{968F914E-AFD7-D361-F302-2958B299BDC7}"/>
-          </ac:spMkLst>
-        </pc:spChg>
-      </pc:sldChg>
-      <pc:sldChg chg="modSp add del mod">
-        <pc:chgData name="faik bilgen" userId="9fcb1696e65a161f" providerId="LiveId" clId="{0C3A4C9E-717D-4ADE-97E0-B0AD580B3355}" dt="2026-01-20T14:32:55.779" v="5788" actId="47"/>
-        <pc:sldMkLst>
-          <pc:docMk/>
-          <pc:sldMk cId="2023419515" sldId="361"/>
-        </pc:sldMkLst>
-        <pc:spChg chg="mod">
-          <ac:chgData name="faik bilgen" userId="9fcb1696e65a161f" providerId="LiveId" clId="{0C3A4C9E-717D-4ADE-97E0-B0AD580B3355}" dt="2026-01-19T12:54:05.843" v="5354"/>
-          <ac:spMkLst>
-            <pc:docMk/>
-            <pc:sldMk cId="2023419515" sldId="361"/>
-            <ac:spMk id="2" creationId="{CD90FB55-8AA5-2161-38B7-9A7A79101521}"/>
-          </ac:spMkLst>
-        </pc:spChg>
-        <pc:spChg chg="mod">
-          <ac:chgData name="faik bilgen" userId="9fcb1696e65a161f" providerId="LiveId" clId="{0C3A4C9E-717D-4ADE-97E0-B0AD580B3355}" dt="2026-01-19T12:54:44.690" v="5356" actId="20577"/>
-          <ac:spMkLst>
-            <pc:docMk/>
-            <pc:sldMk cId="2023419515" sldId="361"/>
-            <ac:spMk id="5" creationId="{F7DD3020-C663-016B-C5A5-9E682BEDDD01}"/>
-          </ac:spMkLst>
-        </pc:spChg>
-      </pc:sldChg>
-      <pc:sldChg chg="modSp add del mod ord">
-        <pc:chgData name="faik bilgen" userId="9fcb1696e65a161f" providerId="LiveId" clId="{0C3A4C9E-717D-4ADE-97E0-B0AD580B3355}" dt="2026-01-20T14:32:55.779" v="5788" actId="47"/>
-        <pc:sldMkLst>
-          <pc:docMk/>
-          <pc:sldMk cId="818778201" sldId="362"/>
-        </pc:sldMkLst>
-        <pc:spChg chg="mod">
-          <ac:chgData name="faik bilgen" userId="9fcb1696e65a161f" providerId="LiveId" clId="{0C3A4C9E-717D-4ADE-97E0-B0AD580B3355}" dt="2026-01-19T13:01:10.829" v="5382" actId="20577"/>
-          <ac:spMkLst>
-            <pc:docMk/>
-            <pc:sldMk cId="818778201" sldId="362"/>
-            <ac:spMk id="3" creationId="{6013CD4F-1411-BB1E-0B04-7C6D2082A9D9}"/>
-          </ac:spMkLst>
-        </pc:spChg>
-      </pc:sldChg>
-      <pc:sldChg chg="add del">
-        <pc:chgData name="faik bilgen" userId="9fcb1696e65a161f" providerId="LiveId" clId="{0C3A4C9E-717D-4ADE-97E0-B0AD580B3355}" dt="2026-01-19T13:01:23.678" v="5384" actId="47"/>
-        <pc:sldMkLst>
-          <pc:docMk/>
-          <pc:sldMk cId="3049854542" sldId="363"/>
-        </pc:sldMkLst>
-      </pc:sldChg>
-      <pc:sldChg chg="addSp delSp modSp new del mod">
-        <pc:chgData name="faik bilgen" userId="9fcb1696e65a161f" providerId="LiveId" clId="{0C3A4C9E-717D-4ADE-97E0-B0AD580B3355}" dt="2026-01-20T14:32:55.779" v="5788" actId="47"/>
-        <pc:sldMkLst>
-          <pc:docMk/>
-          <pc:sldMk cId="4129994756" sldId="363"/>
-        </pc:sldMkLst>
-        <pc:spChg chg="mod">
-          <ac:chgData name="faik bilgen" userId="9fcb1696e65a161f" providerId="LiveId" clId="{0C3A4C9E-717D-4ADE-97E0-B0AD580B3355}" dt="2026-01-19T13:01:40.070" v="5399" actId="20577"/>
-          <ac:spMkLst>
-            <pc:docMk/>
-            <pc:sldMk cId="4129994756" sldId="363"/>
-            <ac:spMk id="2" creationId="{058A4B89-FD2E-CDD1-7B1F-E654DF70EFF8}"/>
-          </ac:spMkLst>
-        </pc:spChg>
-        <pc:spChg chg="del">
-          <ac:chgData name="faik bilgen" userId="9fcb1696e65a161f" providerId="LiveId" clId="{0C3A4C9E-717D-4ADE-97E0-B0AD580B3355}" dt="2026-01-19T13:01:43.927" v="5400" actId="478"/>
-          <ac:spMkLst>
-            <pc:docMk/>
-            <pc:sldMk cId="4129994756" sldId="363"/>
-            <ac:spMk id="3" creationId="{DC4887B9-1F66-082D-7548-5DDECC380C28}"/>
-          </ac:spMkLst>
-        </pc:spChg>
-        <pc:spChg chg="add del">
-          <ac:chgData name="faik bilgen" userId="9fcb1696e65a161f" providerId="LiveId" clId="{0C3A4C9E-717D-4ADE-97E0-B0AD580B3355}" dt="2026-01-19T13:02:02.717" v="5402" actId="22"/>
-          <ac:spMkLst>
-            <pc:docMk/>
-            <pc:sldMk cId="4129994756" sldId="363"/>
-            <ac:spMk id="5" creationId="{17F45925-19C7-C31D-2358-ADDAC3D7FB1B}"/>
-          </ac:spMkLst>
-        </pc:spChg>
-        <pc:spChg chg="add mod">
-          <ac:chgData name="faik bilgen" userId="9fcb1696e65a161f" providerId="LiveId" clId="{0C3A4C9E-717D-4ADE-97E0-B0AD580B3355}" dt="2026-01-19T13:24:51.339" v="5527" actId="1035"/>
-          <ac:spMkLst>
-            <pc:docMk/>
-            <pc:sldMk cId="4129994756" sldId="363"/>
-            <ac:spMk id="7" creationId="{6DAD52E1-88E1-5EB3-D301-338D29F5A4C2}"/>
-          </ac:spMkLst>
-        </pc:spChg>
-        <pc:spChg chg="add mod">
-          <ac:chgData name="faik bilgen" userId="9fcb1696e65a161f" providerId="LiveId" clId="{0C3A4C9E-717D-4ADE-97E0-B0AD580B3355}" dt="2026-01-19T13:26:32.079" v="5542" actId="13926"/>
-          <ac:spMkLst>
-            <pc:docMk/>
-            <pc:sldMk cId="4129994756" sldId="363"/>
-            <ac:spMk id="11" creationId="{A573ECAA-75C6-F13E-F33D-557B1480C020}"/>
-          </ac:spMkLst>
-        </pc:spChg>
-        <pc:graphicFrameChg chg="add mod modGraphic">
-          <ac:chgData name="faik bilgen" userId="9fcb1696e65a161f" providerId="LiveId" clId="{0C3A4C9E-717D-4ADE-97E0-B0AD580B3355}" dt="2026-01-19T13:26:35.913" v="5543" actId="13926"/>
-          <ac:graphicFrameMkLst>
-            <pc:docMk/>
-            <pc:sldMk cId="4129994756" sldId="363"/>
-            <ac:graphicFrameMk id="6" creationId="{A711F935-912B-1B27-1FDB-EDDCE2BEBB3A}"/>
-          </ac:graphicFrameMkLst>
-        </pc:graphicFrameChg>
-        <pc:picChg chg="add del mod">
-          <ac:chgData name="faik bilgen" userId="9fcb1696e65a161f" providerId="LiveId" clId="{0C3A4C9E-717D-4ADE-97E0-B0AD580B3355}" dt="2026-01-19T13:24:33.133" v="5513" actId="478"/>
-          <ac:picMkLst>
-            <pc:docMk/>
-            <pc:sldMk cId="4129994756" sldId="363"/>
-            <ac:picMk id="9" creationId="{241DDED0-B291-C139-04BB-FDC8A9463811}"/>
-          </ac:picMkLst>
-        </pc:picChg>
-      </pc:sldChg>
-      <pc:sldChg chg="addSp delSp modSp add del mod">
-        <pc:chgData name="faik bilgen" userId="9fcb1696e65a161f" providerId="LiveId" clId="{0C3A4C9E-717D-4ADE-97E0-B0AD580B3355}" dt="2026-01-20T14:32:55.779" v="5788" actId="47"/>
-        <pc:sldMkLst>
-          <pc:docMk/>
-          <pc:sldMk cId="917974161" sldId="364"/>
-        </pc:sldMkLst>
-        <pc:spChg chg="del">
-          <ac:chgData name="faik bilgen" userId="9fcb1696e65a161f" providerId="LiveId" clId="{0C3A4C9E-717D-4ADE-97E0-B0AD580B3355}" dt="2026-01-19T13:28:25.491" v="5547" actId="478"/>
-          <ac:spMkLst>
-            <pc:docMk/>
-            <pc:sldMk cId="917974161" sldId="364"/>
-            <ac:spMk id="7" creationId="{69867567-69C5-F1BF-B5E2-D0B776FE9F87}"/>
-          </ac:spMkLst>
-        </pc:spChg>
-        <pc:spChg chg="del mod">
-          <ac:chgData name="faik bilgen" userId="9fcb1696e65a161f" providerId="LiveId" clId="{0C3A4C9E-717D-4ADE-97E0-B0AD580B3355}" dt="2026-01-19T13:28:22.048" v="5546" actId="478"/>
-          <ac:spMkLst>
-            <pc:docMk/>
-            <pc:sldMk cId="917974161" sldId="364"/>
-            <ac:spMk id="11" creationId="{FA1AD63A-B8AB-54E7-83B1-1F21B5620428}"/>
-          </ac:spMkLst>
-        </pc:spChg>
-        <pc:graphicFrameChg chg="del">
-          <ac:chgData name="faik bilgen" userId="9fcb1696e65a161f" providerId="LiveId" clId="{0C3A4C9E-717D-4ADE-97E0-B0AD580B3355}" dt="2026-01-19T13:28:25.491" v="5547" actId="478"/>
-          <ac:graphicFrameMkLst>
-            <pc:docMk/>
-            <pc:sldMk cId="917974161" sldId="364"/>
-            <ac:graphicFrameMk id="6" creationId="{DC80308B-E2FF-AAD3-9ABA-DD5D9E5F9042}"/>
-          </ac:graphicFrameMkLst>
-        </pc:graphicFrameChg>
-        <pc:picChg chg="add mod">
-          <ac:chgData name="faik bilgen" userId="9fcb1696e65a161f" providerId="LiveId" clId="{0C3A4C9E-717D-4ADE-97E0-B0AD580B3355}" dt="2026-01-19T13:28:37.552" v="5550" actId="14100"/>
-          <ac:picMkLst>
-            <pc:docMk/>
-            <pc:sldMk cId="917974161" sldId="364"/>
-            <ac:picMk id="4" creationId="{C09946B4-BAA8-FECA-A3AC-BC44DBAC18AD}"/>
-          </ac:picMkLst>
-        </pc:picChg>
-      </pc:sldChg>
-      <pc:sldChg chg="modSp add del mod ord">
-        <pc:chgData name="faik bilgen" userId="9fcb1696e65a161f" providerId="LiveId" clId="{0C3A4C9E-717D-4ADE-97E0-B0AD580B3355}" dt="2026-01-20T14:32:55.779" v="5788" actId="47"/>
-        <pc:sldMkLst>
-          <pc:docMk/>
-          <pc:sldMk cId="54816947" sldId="365"/>
-        </pc:sldMkLst>
-        <pc:spChg chg="mod">
-          <ac:chgData name="faik bilgen" userId="9fcb1696e65a161f" providerId="LiveId" clId="{0C3A4C9E-717D-4ADE-97E0-B0AD580B3355}" dt="2026-01-19T13:31:06.491" v="5582" actId="20577"/>
-          <ac:spMkLst>
-            <pc:docMk/>
-            <pc:sldMk cId="54816947" sldId="365"/>
-            <ac:spMk id="2" creationId="{9D882827-A7DB-FE5D-80C4-42D6E49AE04D}"/>
-          </ac:spMkLst>
-        </pc:spChg>
-      </pc:sldChg>
       <pc:sldChg chg="addSp delSp modSp new mod setBg">
         <pc:chgData name="faik bilgen" userId="9fcb1696e65a161f" providerId="LiveId" clId="{0C3A4C9E-717D-4ADE-97E0-B0AD580B3355}" dt="2026-01-20T11:25:24.318" v="5772" actId="14100"/>
         <pc:sldMkLst>
@@ -1078,14 +236,6 @@
             <pc:docMk/>
             <pc:sldMk cId="4272325911" sldId="366"/>
             <ac:spMk id="2" creationId="{E6A3B6DF-B8D5-762F-5501-C7BA79361C20}"/>
-          </ac:spMkLst>
-        </pc:spChg>
-        <pc:spChg chg="del">
-          <ac:chgData name="faik bilgen" userId="9fcb1696e65a161f" providerId="LiveId" clId="{0C3A4C9E-717D-4ADE-97E0-B0AD580B3355}" dt="2026-01-20T11:02:27.599" v="5634" actId="478"/>
-          <ac:spMkLst>
-            <pc:docMk/>
-            <pc:sldMk cId="4272325911" sldId="366"/>
-            <ac:spMk id="3" creationId="{6AFE984C-135B-A676-2854-AF19276930F9}"/>
           </ac:spMkLst>
         </pc:spChg>
         <pc:spChg chg="add">
@@ -1151,14 +301,6 @@
             <ac:spMk id="11" creationId="{E81BF4F6-F2CF-4984-9D14-D6966D92F99F}"/>
           </ac:spMkLst>
         </pc:spChg>
-        <pc:picChg chg="del">
-          <ac:chgData name="faik bilgen" userId="9fcb1696e65a161f" providerId="LiveId" clId="{0C3A4C9E-717D-4ADE-97E0-B0AD580B3355}" dt="2026-01-20T11:18:59.224" v="5654" actId="478"/>
-          <ac:picMkLst>
-            <pc:docMk/>
-            <pc:sldMk cId="1519829562" sldId="367"/>
-            <ac:picMk id="5" creationId="{57C0DD2B-22A0-B419-D4A4-2464B0DB3135}"/>
-          </ac:picMkLst>
-        </pc:picChg>
         <pc:picChg chg="add">
           <ac:chgData name="faik bilgen" userId="9fcb1696e65a161f" providerId="LiveId" clId="{0C3A4C9E-717D-4ADE-97E0-B0AD580B3355}" dt="2026-01-20T11:26:44.562" v="5780" actId="26606"/>
           <ac:picMkLst>
@@ -1180,38 +322,6 @@
             <pc:docMk/>
             <pc:sldMk cId="2727749857" sldId="368"/>
             <ac:spMk id="2" creationId="{39654F24-926C-5FC1-CB8F-7C4218C1AB17}"/>
-          </ac:spMkLst>
-        </pc:spChg>
-        <pc:spChg chg="add del">
-          <ac:chgData name="faik bilgen" userId="9fcb1696e65a161f" providerId="LiveId" clId="{0C3A4C9E-717D-4ADE-97E0-B0AD580B3355}" dt="2026-01-20T11:26:23.169" v="5774" actId="26606"/>
-          <ac:spMkLst>
-            <pc:docMk/>
-            <pc:sldMk cId="2727749857" sldId="368"/>
-            <ac:spMk id="8" creationId="{BCED4D40-4B67-4331-AC48-79B82B4A47D8}"/>
-          </ac:spMkLst>
-        </pc:spChg>
-        <pc:spChg chg="add del">
-          <ac:chgData name="faik bilgen" userId="9fcb1696e65a161f" providerId="LiveId" clId="{0C3A4C9E-717D-4ADE-97E0-B0AD580B3355}" dt="2026-01-20T11:26:23.169" v="5774" actId="26606"/>
-          <ac:spMkLst>
-            <pc:docMk/>
-            <pc:sldMk cId="2727749857" sldId="368"/>
-            <ac:spMk id="10" creationId="{670CEDEF-4F34-412E-84EE-329C1E936AF5}"/>
-          </ac:spMkLst>
-        </pc:spChg>
-        <pc:spChg chg="add del">
-          <ac:chgData name="faik bilgen" userId="9fcb1696e65a161f" providerId="LiveId" clId="{0C3A4C9E-717D-4ADE-97E0-B0AD580B3355}" dt="2026-01-20T11:26:24.497" v="5776" actId="26606"/>
-          <ac:spMkLst>
-            <pc:docMk/>
-            <pc:sldMk cId="2727749857" sldId="368"/>
-            <ac:spMk id="12" creationId="{C59AB4C8-9178-4F7A-8404-6890510B5917}"/>
-          </ac:spMkLst>
-        </pc:spChg>
-        <pc:spChg chg="add del">
-          <ac:chgData name="faik bilgen" userId="9fcb1696e65a161f" providerId="LiveId" clId="{0C3A4C9E-717D-4ADE-97E0-B0AD580B3355}" dt="2026-01-20T11:26:24.497" v="5776" actId="26606"/>
-          <ac:spMkLst>
-            <pc:docMk/>
-            <pc:sldMk cId="2727749857" sldId="368"/>
-            <ac:spMk id="13" creationId="{4CFDFB37-4BC7-42C6-915D-A6609139BFE7}"/>
           </ac:spMkLst>
         </pc:spChg>
         <pc:spChg chg="add">
@@ -1236,14 +346,6 @@
             <pc:docMk/>
             <pc:sldMk cId="2727749857" sldId="368"/>
             <ac:picMk id="3" creationId="{E31D764E-E440-96DC-BA93-CAC22A0DB4BF}"/>
-          </ac:picMkLst>
-        </pc:picChg>
-        <pc:picChg chg="del">
-          <ac:chgData name="faik bilgen" userId="9fcb1696e65a161f" providerId="LiveId" clId="{0C3A4C9E-717D-4ADE-97E0-B0AD580B3355}" dt="2026-01-20T11:24:52.236" v="5766" actId="478"/>
-          <ac:picMkLst>
-            <pc:docMk/>
-            <pc:sldMk cId="2727749857" sldId="368"/>
-            <ac:picMk id="5" creationId="{42AE7E5D-12C1-7D40-669F-228584A23D70}"/>
           </ac:picMkLst>
         </pc:picChg>
       </pc:sldChg>
@@ -1349,7 +451,7 @@
           <a:p>
             <a:fld id="{0385D07E-B132-4C8F-A144-2D501431D798}" type="datetimeFigureOut">
               <a:rPr lang="en-US" smtClean="0"/>
-              <a:t>1/20/2026</a:t>
+              <a:t>2/1/2026</a:t>
             </a:fld>
             <a:endParaRPr lang="en-US"/>
           </a:p>
@@ -1687,7 +789,7 @@
           <a:p>
             <a:fld id="{08A7B8A6-DC2C-4E66-899B-3FF6576B90A7}" type="slidenum">
               <a:rPr lang="en-US" smtClean="0"/>
-              <a:t>3</a:t>
+              <a:t>6</a:t>
             </a:fld>
             <a:endParaRPr lang="en-US"/>
           </a:p>
@@ -1853,7 +955,7 @@
           <a:p>
             <a:fld id="{B9268321-C9E7-441E-8ECB-F5B48CA38B30}" type="datetimeFigureOut">
               <a:rPr lang="en-US" smtClean="0"/>
-              <a:t>1/20/2026</a:t>
+              <a:t>2/1/2026</a:t>
             </a:fld>
             <a:endParaRPr lang="en-US"/>
           </a:p>
@@ -2051,7 +1153,7 @@
           <a:p>
             <a:fld id="{B9268321-C9E7-441E-8ECB-F5B48CA38B30}" type="datetimeFigureOut">
               <a:rPr lang="en-US" smtClean="0"/>
-              <a:t>1/20/2026</a:t>
+              <a:t>2/1/2026</a:t>
             </a:fld>
             <a:endParaRPr lang="en-US"/>
           </a:p>
@@ -2259,7 +1361,7 @@
           <a:p>
             <a:fld id="{B9268321-C9E7-441E-8ECB-F5B48CA38B30}" type="datetimeFigureOut">
               <a:rPr lang="en-US" smtClean="0"/>
-              <a:t>1/20/2026</a:t>
+              <a:t>2/1/2026</a:t>
             </a:fld>
             <a:endParaRPr lang="en-US"/>
           </a:p>
@@ -2457,7 +1559,7 @@
           <a:p>
             <a:fld id="{B9268321-C9E7-441E-8ECB-F5B48CA38B30}" type="datetimeFigureOut">
               <a:rPr lang="en-US" smtClean="0"/>
-              <a:t>1/20/2026</a:t>
+              <a:t>2/1/2026</a:t>
             </a:fld>
             <a:endParaRPr lang="en-US"/>
           </a:p>
@@ -2732,7 +1834,7 @@
           <a:p>
             <a:fld id="{B9268321-C9E7-441E-8ECB-F5B48CA38B30}" type="datetimeFigureOut">
               <a:rPr lang="en-US" smtClean="0"/>
-              <a:t>1/20/2026</a:t>
+              <a:t>2/1/2026</a:t>
             </a:fld>
             <a:endParaRPr lang="en-US"/>
           </a:p>
@@ -2997,7 +2099,7 @@
           <a:p>
             <a:fld id="{B9268321-C9E7-441E-8ECB-F5B48CA38B30}" type="datetimeFigureOut">
               <a:rPr lang="en-US" smtClean="0"/>
-              <a:t>1/20/2026</a:t>
+              <a:t>2/1/2026</a:t>
             </a:fld>
             <a:endParaRPr lang="en-US"/>
           </a:p>
@@ -3409,7 +2511,7 @@
           <a:p>
             <a:fld id="{B9268321-C9E7-441E-8ECB-F5B48CA38B30}" type="datetimeFigureOut">
               <a:rPr lang="en-US" smtClean="0"/>
-              <a:t>1/20/2026</a:t>
+              <a:t>2/1/2026</a:t>
             </a:fld>
             <a:endParaRPr lang="en-US"/>
           </a:p>
@@ -3550,7 +2652,7 @@
           <a:p>
             <a:fld id="{B9268321-C9E7-441E-8ECB-F5B48CA38B30}" type="datetimeFigureOut">
               <a:rPr lang="en-US" smtClean="0"/>
-              <a:t>1/20/2026</a:t>
+              <a:t>2/1/2026</a:t>
             </a:fld>
             <a:endParaRPr lang="en-US"/>
           </a:p>
@@ -3663,7 +2765,7 @@
           <a:p>
             <a:fld id="{B9268321-C9E7-441E-8ECB-F5B48CA38B30}" type="datetimeFigureOut">
               <a:rPr lang="en-US" smtClean="0"/>
-              <a:t>1/20/2026</a:t>
+              <a:t>2/1/2026</a:t>
             </a:fld>
             <a:endParaRPr lang="en-US"/>
           </a:p>
@@ -3974,7 +3076,7 @@
           <a:p>
             <a:fld id="{B9268321-C9E7-441E-8ECB-F5B48CA38B30}" type="datetimeFigureOut">
               <a:rPr lang="en-US" smtClean="0"/>
-              <a:t>1/20/2026</a:t>
+              <a:t>2/1/2026</a:t>
             </a:fld>
             <a:endParaRPr lang="en-US"/>
           </a:p>
@@ -4262,7 +3364,7 @@
           <a:p>
             <a:fld id="{B9268321-C9E7-441E-8ECB-F5B48CA38B30}" type="datetimeFigureOut">
               <a:rPr lang="en-US" smtClean="0"/>
-              <a:t>1/20/2026</a:t>
+              <a:t>2/1/2026</a:t>
             </a:fld>
             <a:endParaRPr lang="en-US"/>
           </a:p>
@@ -4503,7 +3605,7 @@
           <a:p>
             <a:fld id="{B9268321-C9E7-441E-8ECB-F5B48CA38B30}" type="datetimeFigureOut">
               <a:rPr lang="en-US" smtClean="0"/>
-              <a:t>1/20/2026</a:t>
+              <a:t>2/1/2026</a:t>
             </a:fld>
             <a:endParaRPr lang="en-US"/>
           </a:p>
@@ -5681,623 +4783,6 @@
       </p:grpSpPr>
       <p:sp useBgFill="1">
         <p:nvSpPr>
-          <p:cNvPr id="8" name="Rectangle 7">
-            <a:extLst>
-              <a:ext uri="{FF2B5EF4-FFF2-40B4-BE49-F238E27FC236}">
-                <a16:creationId xmlns:a16="http://schemas.microsoft.com/office/drawing/2014/main" id="{943CAA20-3569-4189-9E48-239A229A86CA}"/>
-              </a:ext>
-              <a:ext uri="{C183D7F6-B498-43B3-948B-1728B52AA6E4}">
-                <adec:decorative xmlns:adec="http://schemas.microsoft.com/office/drawing/2017/decorative" val="1"/>
-              </a:ext>
-            </a:extLst>
-          </p:cNvPr>
-          <p:cNvSpPr>
-            <a:spLocks noGrp="1" noRot="1" noChangeAspect="1" noMove="1" noResize="1" noEditPoints="1" noAdjustHandles="1" noChangeArrowheads="1" noChangeShapeType="1" noTextEdit="1"/>
-          </p:cNvSpPr>
-          <p:nvPr>
-            <p:extLst>
-              <p:ext uri="{386F3935-93C4-4BCD-93E2-E3B085C9AB24}">
-                <p16:designElem xmlns:p16="http://schemas.microsoft.com/office/powerpoint/2015/main" val="1"/>
-              </p:ext>
-            </p:extLst>
-          </p:nvPr>
-        </p:nvSpPr>
-        <p:spPr>
-          <a:xfrm>
-            <a:off x="0" y="0"/>
-            <a:ext cx="12188952" cy="6858000"/>
-          </a:xfrm>
-          <a:prstGeom prst="rect">
-            <a:avLst/>
-          </a:prstGeom>
-          <a:ln>
-            <a:noFill/>
-          </a:ln>
-        </p:spPr>
-        <p:style>
-          <a:lnRef idx="2">
-            <a:schemeClr val="accent1">
-              <a:shade val="50000"/>
-            </a:schemeClr>
-          </a:lnRef>
-          <a:fillRef idx="1">
-            <a:schemeClr val="accent1"/>
-          </a:fillRef>
-          <a:effectRef idx="0">
-            <a:schemeClr val="accent1"/>
-          </a:effectRef>
-          <a:fontRef idx="minor">
-            <a:schemeClr val="lt1"/>
-          </a:fontRef>
-        </p:style>
-        <p:txBody>
-          <a:bodyPr rtlCol="0" anchor="ctr"/>
-          <a:lstStyle/>
-          <a:p>
-            <a:pPr marL="0" marR="0" lvl="0" indent="0" algn="ctr" defTabSz="914400" rtl="0" eaLnBrk="1" fontAlgn="auto" latinLnBrk="0" hangingPunct="1">
-              <a:lnSpc>
-                <a:spcPct val="100000"/>
-              </a:lnSpc>
-              <a:spcBef>
-                <a:spcPts val="0"/>
-              </a:spcBef>
-              <a:spcAft>
-                <a:spcPts val="0"/>
-              </a:spcAft>
-              <a:buClrTx/>
-              <a:buSzTx/>
-              <a:buFontTx/>
-              <a:buNone/>
-              <a:tabLst/>
-              <a:defRPr/>
-            </a:pPr>
-            <a:endParaRPr kumimoji="0" lang="en-US" sz="1800" b="0" i="0" u="none" strike="noStrike" kern="1200" cap="none" spc="0" normalizeH="0" baseline="0" noProof="0">
-              <a:ln>
-                <a:noFill/>
-              </a:ln>
-              <a:solidFill>
-                <a:prstClr val="white"/>
-              </a:solidFill>
-              <a:effectLst/>
-              <a:uLnTx/>
-              <a:uFillTx/>
-              <a:latin typeface="Aptos" panose="02110004020202020204"/>
-              <a:ea typeface="+mn-ea"/>
-              <a:cs typeface="+mn-cs"/>
-            </a:endParaRPr>
-          </a:p>
-        </p:txBody>
-      </p:sp>
-      <p:sp>
-        <p:nvSpPr>
-          <p:cNvPr id="2" name="Title 1">
-            <a:extLst>
-              <a:ext uri="{FF2B5EF4-FFF2-40B4-BE49-F238E27FC236}">
-                <a16:creationId xmlns:a16="http://schemas.microsoft.com/office/drawing/2014/main" id="{C2B108BA-CE66-2908-88CD-284D3F55490C}"/>
-              </a:ext>
-            </a:extLst>
-          </p:cNvPr>
-          <p:cNvSpPr>
-            <a:spLocks noGrp="1"/>
-          </p:cNvSpPr>
-          <p:nvPr>
-            <p:ph type="title"/>
-          </p:nvPr>
-        </p:nvSpPr>
-        <p:spPr>
-          <a:xfrm>
-            <a:off x="838200" y="451381"/>
-            <a:ext cx="10512552" cy="4066540"/>
-          </a:xfrm>
-        </p:spPr>
-        <p:txBody>
-          <a:bodyPr vert="horz" lIns="91440" tIns="45720" rIns="91440" bIns="45720" rtlCol="0" anchor="b">
-            <a:normAutofit/>
-          </a:bodyPr>
-          <a:lstStyle/>
-          <a:p>
-            <a:r>
-              <a:rPr lang="en-US" sz="6600" kern="1200">
-                <a:solidFill>
-                  <a:schemeClr val="tx1"/>
-                </a:solidFill>
-                <a:latin typeface="+mj-lt"/>
-                <a:ea typeface="+mj-ea"/>
-                <a:cs typeface="+mj-cs"/>
-              </a:rPr>
-              <a:t>DEMO</a:t>
-            </a:r>
-          </a:p>
-        </p:txBody>
-      </p:sp>
-      <p:sp>
-        <p:nvSpPr>
-          <p:cNvPr id="3" name="Content Placeholder 2">
-            <a:extLst>
-              <a:ext uri="{FF2B5EF4-FFF2-40B4-BE49-F238E27FC236}">
-                <a16:creationId xmlns:a16="http://schemas.microsoft.com/office/drawing/2014/main" id="{ABE0EBD9-543C-DF01-01FB-128713202535}"/>
-              </a:ext>
-            </a:extLst>
-          </p:cNvPr>
-          <p:cNvSpPr>
-            <a:spLocks noGrp="1"/>
-          </p:cNvSpPr>
-          <p:nvPr>
-            <p:ph idx="1"/>
-          </p:nvPr>
-        </p:nvSpPr>
-        <p:spPr>
-          <a:xfrm>
-            <a:off x="838199" y="4983276"/>
-            <a:ext cx="10512552" cy="1126680"/>
-          </a:xfrm>
-        </p:spPr>
-        <p:txBody>
-          <a:bodyPr vert="horz" lIns="91440" tIns="45720" rIns="91440" bIns="45720" rtlCol="0">
-            <a:normAutofit/>
-          </a:bodyPr>
-          <a:lstStyle/>
-          <a:p>
-            <a:pPr marL="0" indent="0">
-              <a:buNone/>
-            </a:pPr>
-            <a:r>
-              <a:rPr lang="en-US" sz="2400" dirty="0"/>
-              <a:t>Advanced Observability Concepts</a:t>
-            </a:r>
-            <a:endParaRPr lang="en-US" sz="2400" kern="1200" dirty="0">
-              <a:solidFill>
-                <a:schemeClr val="tx1"/>
-              </a:solidFill>
-              <a:latin typeface="+mn-lt"/>
-              <a:ea typeface="+mn-ea"/>
-              <a:cs typeface="+mn-cs"/>
-            </a:endParaRPr>
-          </a:p>
-        </p:txBody>
-      </p:sp>
-      <p:sp>
-        <p:nvSpPr>
-          <p:cNvPr id="10" name="sketch line">
-            <a:extLst>
-              <a:ext uri="{FF2B5EF4-FFF2-40B4-BE49-F238E27FC236}">
-                <a16:creationId xmlns:a16="http://schemas.microsoft.com/office/drawing/2014/main" id="{DA542B6D-E775-4832-91DC-2D20F857813A}"/>
-              </a:ext>
-              <a:ext uri="{C183D7F6-B498-43B3-948B-1728B52AA6E4}">
-                <adec:decorative xmlns:adec="http://schemas.microsoft.com/office/drawing/2017/decorative" val="1"/>
-              </a:ext>
-            </a:extLst>
-          </p:cNvPr>
-          <p:cNvSpPr>
-            <a:spLocks noGrp="1" noRot="1" noChangeAspect="1" noMove="1" noResize="1" noEditPoints="1" noAdjustHandles="1" noChangeArrowheads="1" noChangeShapeType="1" noTextEdit="1"/>
-          </p:cNvSpPr>
-          <p:nvPr>
-            <p:extLst>
-              <p:ext uri="{386F3935-93C4-4BCD-93E2-E3B085C9AB24}">
-                <p16:designElem xmlns:p16="http://schemas.microsoft.com/office/powerpoint/2015/main" val="1"/>
-              </p:ext>
-            </p:extLst>
-          </p:nvPr>
-        </p:nvSpPr>
-        <p:spPr>
-          <a:xfrm>
-            <a:off x="838200" y="4718595"/>
-            <a:ext cx="5410200" cy="18288"/>
-          </a:xfrm>
-          <a:custGeom>
-            <a:avLst/>
-            <a:gdLst>
-              <a:gd name="csX0" fmla="*/ 0 w 5410200"/>
-              <a:gd name="csY0" fmla="*/ 0 h 18288"/>
-              <a:gd name="csX1" fmla="*/ 568071 w 5410200"/>
-              <a:gd name="csY1" fmla="*/ 0 h 18288"/>
-              <a:gd name="csX2" fmla="*/ 1298448 w 5410200"/>
-              <a:gd name="csY2" fmla="*/ 0 h 18288"/>
-              <a:gd name="csX3" fmla="*/ 1920621 w 5410200"/>
-              <a:gd name="csY3" fmla="*/ 0 h 18288"/>
-              <a:gd name="csX4" fmla="*/ 2488692 w 5410200"/>
-              <a:gd name="csY4" fmla="*/ 0 h 18288"/>
-              <a:gd name="csX5" fmla="*/ 3219069 w 5410200"/>
-              <a:gd name="csY5" fmla="*/ 0 h 18288"/>
-              <a:gd name="csX6" fmla="*/ 3895344 w 5410200"/>
-              <a:gd name="csY6" fmla="*/ 0 h 18288"/>
-              <a:gd name="csX7" fmla="*/ 4571619 w 5410200"/>
-              <a:gd name="csY7" fmla="*/ 0 h 18288"/>
-              <a:gd name="csX8" fmla="*/ 5410200 w 5410200"/>
-              <a:gd name="csY8" fmla="*/ 0 h 18288"/>
-              <a:gd name="csX9" fmla="*/ 5410200 w 5410200"/>
-              <a:gd name="csY9" fmla="*/ 18288 h 18288"/>
-              <a:gd name="csX10" fmla="*/ 4842129 w 5410200"/>
-              <a:gd name="csY10" fmla="*/ 18288 h 18288"/>
-              <a:gd name="csX11" fmla="*/ 4328160 w 5410200"/>
-              <a:gd name="csY11" fmla="*/ 18288 h 18288"/>
-              <a:gd name="csX12" fmla="*/ 3597783 w 5410200"/>
-              <a:gd name="csY12" fmla="*/ 18288 h 18288"/>
-              <a:gd name="csX13" fmla="*/ 3029712 w 5410200"/>
-              <a:gd name="csY13" fmla="*/ 18288 h 18288"/>
-              <a:gd name="csX14" fmla="*/ 2299335 w 5410200"/>
-              <a:gd name="csY14" fmla="*/ 18288 h 18288"/>
-              <a:gd name="csX15" fmla="*/ 1514856 w 5410200"/>
-              <a:gd name="csY15" fmla="*/ 18288 h 18288"/>
-              <a:gd name="csX16" fmla="*/ 892683 w 5410200"/>
-              <a:gd name="csY16" fmla="*/ 18288 h 18288"/>
-              <a:gd name="csX17" fmla="*/ 0 w 5410200"/>
-              <a:gd name="csY17" fmla="*/ 18288 h 18288"/>
-              <a:gd name="csX18" fmla="*/ 0 w 5410200"/>
-              <a:gd name="csY18" fmla="*/ 0 h 18288"/>
-            </a:gdLst>
-            <a:ahLst/>
-            <a:cxnLst>
-              <a:cxn ang="0">
-                <a:pos x="csX0" y="csY0"/>
-              </a:cxn>
-              <a:cxn ang="0">
-                <a:pos x="csX1" y="csY1"/>
-              </a:cxn>
-              <a:cxn ang="0">
-                <a:pos x="csX2" y="csY2"/>
-              </a:cxn>
-              <a:cxn ang="0">
-                <a:pos x="csX3" y="csY3"/>
-              </a:cxn>
-              <a:cxn ang="0">
-                <a:pos x="csX4" y="csY4"/>
-              </a:cxn>
-              <a:cxn ang="0">
-                <a:pos x="csX5" y="csY5"/>
-              </a:cxn>
-              <a:cxn ang="0">
-                <a:pos x="csX6" y="csY6"/>
-              </a:cxn>
-              <a:cxn ang="0">
-                <a:pos x="csX7" y="csY7"/>
-              </a:cxn>
-              <a:cxn ang="0">
-                <a:pos x="csX8" y="csY8"/>
-              </a:cxn>
-              <a:cxn ang="0">
-                <a:pos x="csX9" y="csY9"/>
-              </a:cxn>
-              <a:cxn ang="0">
-                <a:pos x="csX10" y="csY10"/>
-              </a:cxn>
-              <a:cxn ang="0">
-                <a:pos x="csX11" y="csY11"/>
-              </a:cxn>
-              <a:cxn ang="0">
-                <a:pos x="csX12" y="csY12"/>
-              </a:cxn>
-              <a:cxn ang="0">
-                <a:pos x="csX13" y="csY13"/>
-              </a:cxn>
-              <a:cxn ang="0">
-                <a:pos x="csX14" y="csY14"/>
-              </a:cxn>
-              <a:cxn ang="0">
-                <a:pos x="csX15" y="csY15"/>
-              </a:cxn>
-              <a:cxn ang="0">
-                <a:pos x="csX16" y="csY16"/>
-              </a:cxn>
-              <a:cxn ang="0">
-                <a:pos x="csX17" y="csY17"/>
-              </a:cxn>
-              <a:cxn ang="0">
-                <a:pos x="csX18" y="csY18"/>
-              </a:cxn>
-            </a:cxnLst>
-            <a:rect l="l" t="t" r="r" b="b"/>
-            <a:pathLst>
-              <a:path w="5410200" h="18288" fill="none" extrusionOk="0">
-                <a:moveTo>
-                  <a:pt x="0" y="0"/>
-                </a:moveTo>
-                <a:cubicBezTo>
-                  <a:pt x="163050" y="-18707"/>
-                  <a:pt x="319321" y="-16364"/>
-                  <a:pt x="568071" y="0"/>
-                </a:cubicBezTo>
-                <a:cubicBezTo>
-                  <a:pt x="816821" y="16364"/>
-                  <a:pt x="1013224" y="-7268"/>
-                  <a:pt x="1298448" y="0"/>
-                </a:cubicBezTo>
-                <a:cubicBezTo>
-                  <a:pt x="1583672" y="7268"/>
-                  <a:pt x="1631711" y="-3367"/>
-                  <a:pt x="1920621" y="0"/>
-                </a:cubicBezTo>
-                <a:cubicBezTo>
-                  <a:pt x="2209531" y="3367"/>
-                  <a:pt x="2364420" y="-19184"/>
-                  <a:pt x="2488692" y="0"/>
-                </a:cubicBezTo>
-                <a:cubicBezTo>
-                  <a:pt x="2612964" y="19184"/>
-                  <a:pt x="3023298" y="-34627"/>
-                  <a:pt x="3219069" y="0"/>
-                </a:cubicBezTo>
-                <a:cubicBezTo>
-                  <a:pt x="3414840" y="34627"/>
-                  <a:pt x="3656810" y="24043"/>
-                  <a:pt x="3895344" y="0"/>
-                </a:cubicBezTo>
-                <a:cubicBezTo>
-                  <a:pt x="4133879" y="-24043"/>
-                  <a:pt x="4393984" y="-19577"/>
-                  <a:pt x="4571619" y="0"/>
-                </a:cubicBezTo>
-                <a:cubicBezTo>
-                  <a:pt x="4749255" y="19577"/>
-                  <a:pt x="5179928" y="-6281"/>
-                  <a:pt x="5410200" y="0"/>
-                </a:cubicBezTo>
-                <a:cubicBezTo>
-                  <a:pt x="5410730" y="6954"/>
-                  <a:pt x="5410934" y="12839"/>
-                  <a:pt x="5410200" y="18288"/>
-                </a:cubicBezTo>
-                <a:cubicBezTo>
-                  <a:pt x="5139060" y="6751"/>
-                  <a:pt x="5121593" y="31035"/>
-                  <a:pt x="4842129" y="18288"/>
-                </a:cubicBezTo>
-                <a:cubicBezTo>
-                  <a:pt x="4562665" y="5541"/>
-                  <a:pt x="4448273" y="9487"/>
-                  <a:pt x="4328160" y="18288"/>
-                </a:cubicBezTo>
-                <a:cubicBezTo>
-                  <a:pt x="4208047" y="27089"/>
-                  <a:pt x="3760936" y="22567"/>
-                  <a:pt x="3597783" y="18288"/>
-                </a:cubicBezTo>
-                <a:cubicBezTo>
-                  <a:pt x="3434630" y="14009"/>
-                  <a:pt x="3299718" y="33213"/>
-                  <a:pt x="3029712" y="18288"/>
-                </a:cubicBezTo>
-                <a:cubicBezTo>
-                  <a:pt x="2759706" y="3363"/>
-                  <a:pt x="2640159" y="27394"/>
-                  <a:pt x="2299335" y="18288"/>
-                </a:cubicBezTo>
-                <a:cubicBezTo>
-                  <a:pt x="1958511" y="9182"/>
-                  <a:pt x="1801186" y="28985"/>
-                  <a:pt x="1514856" y="18288"/>
-                </a:cubicBezTo>
-                <a:cubicBezTo>
-                  <a:pt x="1228526" y="7591"/>
-                  <a:pt x="1063509" y="-5305"/>
-                  <a:pt x="892683" y="18288"/>
-                </a:cubicBezTo>
-                <a:cubicBezTo>
-                  <a:pt x="721857" y="41881"/>
-                  <a:pt x="186945" y="-20897"/>
-                  <a:pt x="0" y="18288"/>
-                </a:cubicBezTo>
-                <a:cubicBezTo>
-                  <a:pt x="-570" y="9279"/>
-                  <a:pt x="132" y="5100"/>
-                  <a:pt x="0" y="0"/>
-                </a:cubicBezTo>
-                <a:close/>
-              </a:path>
-              <a:path w="5410200" h="18288" stroke="0" extrusionOk="0">
-                <a:moveTo>
-                  <a:pt x="0" y="0"/>
-                </a:moveTo>
-                <a:cubicBezTo>
-                  <a:pt x="285096" y="-4925"/>
-                  <a:pt x="376456" y="22268"/>
-                  <a:pt x="622173" y="0"/>
-                </a:cubicBezTo>
-                <a:cubicBezTo>
-                  <a:pt x="867890" y="-22268"/>
-                  <a:pt x="1031392" y="7228"/>
-                  <a:pt x="1136142" y="0"/>
-                </a:cubicBezTo>
-                <a:cubicBezTo>
-                  <a:pt x="1240892" y="-7228"/>
-                  <a:pt x="1561853" y="9877"/>
-                  <a:pt x="1920621" y="0"/>
-                </a:cubicBezTo>
-                <a:cubicBezTo>
-                  <a:pt x="2279389" y="-9877"/>
-                  <a:pt x="2367255" y="19546"/>
-                  <a:pt x="2542794" y="0"/>
-                </a:cubicBezTo>
-                <a:cubicBezTo>
-                  <a:pt x="2718333" y="-19546"/>
-                  <a:pt x="2866732" y="-22226"/>
-                  <a:pt x="3164967" y="0"/>
-                </a:cubicBezTo>
-                <a:cubicBezTo>
-                  <a:pt x="3463202" y="22226"/>
-                  <a:pt x="3568055" y="-2765"/>
-                  <a:pt x="3949446" y="0"/>
-                </a:cubicBezTo>
-                <a:cubicBezTo>
-                  <a:pt x="4330837" y="2765"/>
-                  <a:pt x="4287895" y="10557"/>
-                  <a:pt x="4517517" y="0"/>
-                </a:cubicBezTo>
-                <a:cubicBezTo>
-                  <a:pt x="4747139" y="-10557"/>
-                  <a:pt x="5149588" y="8716"/>
-                  <a:pt x="5410200" y="0"/>
-                </a:cubicBezTo>
-                <a:cubicBezTo>
-                  <a:pt x="5409517" y="5414"/>
-                  <a:pt x="5409480" y="12510"/>
-                  <a:pt x="5410200" y="18288"/>
-                </a:cubicBezTo>
-                <a:cubicBezTo>
-                  <a:pt x="5163327" y="41494"/>
-                  <a:pt x="5008749" y="10693"/>
-                  <a:pt x="4842129" y="18288"/>
-                </a:cubicBezTo>
-                <a:cubicBezTo>
-                  <a:pt x="4675509" y="25883"/>
-                  <a:pt x="4433401" y="-615"/>
-                  <a:pt x="4165854" y="18288"/>
-                </a:cubicBezTo>
-                <a:cubicBezTo>
-                  <a:pt x="3898308" y="37191"/>
-                  <a:pt x="3809032" y="-8710"/>
-                  <a:pt x="3543681" y="18288"/>
-                </a:cubicBezTo>
-                <a:cubicBezTo>
-                  <a:pt x="3278330" y="45286"/>
-                  <a:pt x="3073876" y="-15917"/>
-                  <a:pt x="2759202" y="18288"/>
-                </a:cubicBezTo>
-                <a:cubicBezTo>
-                  <a:pt x="2444528" y="52493"/>
-                  <a:pt x="2204144" y="3372"/>
-                  <a:pt x="1974723" y="18288"/>
-                </a:cubicBezTo>
-                <a:cubicBezTo>
-                  <a:pt x="1745302" y="33204"/>
-                  <a:pt x="1602335" y="31490"/>
-                  <a:pt x="1406652" y="18288"/>
-                </a:cubicBezTo>
-                <a:cubicBezTo>
-                  <a:pt x="1210969" y="5086"/>
-                  <a:pt x="923948" y="3161"/>
-                  <a:pt x="730377" y="18288"/>
-                </a:cubicBezTo>
-                <a:cubicBezTo>
-                  <a:pt x="536806" y="33415"/>
-                  <a:pt x="336496" y="-141"/>
-                  <a:pt x="0" y="18288"/>
-                </a:cubicBezTo>
-                <a:cubicBezTo>
-                  <a:pt x="-306" y="11061"/>
-                  <a:pt x="-655" y="7751"/>
-                  <a:pt x="0" y="0"/>
-                </a:cubicBezTo>
-                <a:close/>
-              </a:path>
-            </a:pathLst>
-          </a:custGeom>
-          <a:solidFill>
-            <a:schemeClr val="accent2"/>
-          </a:solidFill>
-          <a:ln w="41275" cap="rnd">
-            <a:solidFill>
-              <a:schemeClr val="accent2"/>
-            </a:solidFill>
-            <a:round/>
-            <a:extLst>
-              <a:ext uri="{C807C97D-BFC1-408E-A445-0C87EB9F89A2}">
-                <ask:lineSketchStyleProps xmlns:ask="http://schemas.microsoft.com/office/drawing/2018/sketchyshapes" sd="1219033472">
-                  <a:prstGeom prst="rect">
-                    <a:avLst/>
-                  </a:prstGeom>
-                  <ask:type>
-                    <ask:lineSketchFreehand/>
-                  </ask:type>
-                </ask:lineSketchStyleProps>
-              </a:ext>
-            </a:extLst>
-          </a:ln>
-        </p:spPr>
-        <p:style>
-          <a:lnRef idx="2">
-            <a:schemeClr val="accent1">
-              <a:shade val="50000"/>
-            </a:schemeClr>
-          </a:lnRef>
-          <a:fillRef idx="1">
-            <a:schemeClr val="accent1"/>
-          </a:fillRef>
-          <a:effectRef idx="0">
-            <a:schemeClr val="accent1"/>
-          </a:effectRef>
-          <a:fontRef idx="minor">
-            <a:schemeClr val="lt1"/>
-          </a:fontRef>
-        </p:style>
-        <p:txBody>
-          <a:bodyPr rtlCol="0" anchor="ctr"/>
-          <a:lstStyle/>
-          <a:p>
-            <a:pPr marL="0" marR="0" lvl="0" indent="0" algn="ctr" defTabSz="914400" rtl="0" eaLnBrk="1" fontAlgn="auto" latinLnBrk="0" hangingPunct="1">
-              <a:lnSpc>
-                <a:spcPct val="100000"/>
-              </a:lnSpc>
-              <a:spcBef>
-                <a:spcPts val="0"/>
-              </a:spcBef>
-              <a:spcAft>
-                <a:spcPts val="0"/>
-              </a:spcAft>
-              <a:buClrTx/>
-              <a:buSzTx/>
-              <a:buFontTx/>
-              <a:buNone/>
-              <a:tabLst/>
-              <a:defRPr/>
-            </a:pPr>
-            <a:endParaRPr kumimoji="0" lang="en-US" sz="1800" b="0" i="0" u="none" strike="noStrike" kern="1200" cap="none" spc="0" normalizeH="0" baseline="0" noProof="0">
-              <a:ln>
-                <a:noFill/>
-              </a:ln>
-              <a:solidFill>
-                <a:prstClr val="white"/>
-              </a:solidFill>
-              <a:effectLst/>
-              <a:uLnTx/>
-              <a:uFillTx/>
-              <a:latin typeface="Aptos" panose="02110004020202020204"/>
-              <a:ea typeface="+mn-ea"/>
-              <a:cs typeface="+mn-cs"/>
-            </a:endParaRPr>
-          </a:p>
-        </p:txBody>
-      </p:sp>
-    </p:spTree>
-    <p:extLst>
-      <p:ext uri="{BB962C8B-B14F-4D97-AF65-F5344CB8AC3E}">
-        <p14:creationId xmlns:p14="http://schemas.microsoft.com/office/powerpoint/2010/main" val="2540744057"/>
-      </p:ext>
-    </p:extLst>
-  </p:cSld>
-  <p:clrMapOvr>
-    <a:masterClrMapping/>
-  </p:clrMapOvr>
-</p:sld>
-</file>
-
-<file path=ppt/slides/slide4.xml><?xml version="1.0" encoding="utf-8"?>
-<p:sld xmlns:a="http://schemas.openxmlformats.org/drawingml/2006/main" xmlns:r="http://schemas.openxmlformats.org/officeDocument/2006/relationships" xmlns:p="http://schemas.openxmlformats.org/presentationml/2006/main">
-  <p:cSld>
-    <p:bg>
-      <p:bgPr>
-        <a:solidFill>
-          <a:schemeClr val="bg1"/>
-        </a:solidFill>
-        <a:effectLst/>
-      </p:bgPr>
-    </p:bg>
-    <p:spTree>
-      <p:nvGrpSpPr>
-        <p:cNvPr id="1" name=""/>
-        <p:cNvGrpSpPr/>
-        <p:nvPr/>
-      </p:nvGrpSpPr>
-      <p:grpSpPr>
-        <a:xfrm>
-          <a:off x="0" y="0"/>
-          <a:ext cx="0" cy="0"/>
-          <a:chOff x="0" y="0"/>
-          <a:chExt cx="0" cy="0"/>
-        </a:xfrm>
-      </p:grpSpPr>
-      <p:sp useBgFill="1">
-        <p:nvSpPr>
           <p:cNvPr id="10" name="Rectangle 9">
             <a:extLst>
               <a:ext uri="{FF2B5EF4-FFF2-40B4-BE49-F238E27FC236}">
@@ -6785,7 +5270,7 @@
 </p:sld>
 </file>
 
-<file path=ppt/slides/slide5.xml><?xml version="1.0" encoding="utf-8"?>
+<file path=ppt/slides/slide4.xml><?xml version="1.0" encoding="utf-8"?>
 <p:sld xmlns:a="http://schemas.openxmlformats.org/drawingml/2006/main" xmlns:r="http://schemas.openxmlformats.org/officeDocument/2006/relationships" xmlns:p="http://schemas.openxmlformats.org/presentationml/2006/main">
   <p:cSld>
     <p:bg>
@@ -7305,7 +5790,7 @@
 </p:sld>
 </file>
 
-<file path=ppt/slides/slide6.xml><?xml version="1.0" encoding="utf-8"?>
+<file path=ppt/slides/slide5.xml><?xml version="1.0" encoding="utf-8"?>
 <p:sld xmlns:a="http://schemas.openxmlformats.org/drawingml/2006/main" xmlns:r="http://schemas.openxmlformats.org/officeDocument/2006/relationships" xmlns:p="http://schemas.openxmlformats.org/presentationml/2006/main">
   <p:cSld>
     <p:bg>
@@ -7796,6 +6281,623 @@
     <p:extLst>
       <p:ext uri="{BB962C8B-B14F-4D97-AF65-F5344CB8AC3E}">
         <p14:creationId xmlns:p14="http://schemas.microsoft.com/office/powerpoint/2010/main" val="1519829562"/>
+      </p:ext>
+    </p:extLst>
+  </p:cSld>
+  <p:clrMapOvr>
+    <a:masterClrMapping/>
+  </p:clrMapOvr>
+</p:sld>
+</file>
+
+<file path=ppt/slides/slide6.xml><?xml version="1.0" encoding="utf-8"?>
+<p:sld xmlns:a="http://schemas.openxmlformats.org/drawingml/2006/main" xmlns:r="http://schemas.openxmlformats.org/officeDocument/2006/relationships" xmlns:p="http://schemas.openxmlformats.org/presentationml/2006/main">
+  <p:cSld>
+    <p:bg>
+      <p:bgPr>
+        <a:solidFill>
+          <a:schemeClr val="bg1"/>
+        </a:solidFill>
+        <a:effectLst/>
+      </p:bgPr>
+    </p:bg>
+    <p:spTree>
+      <p:nvGrpSpPr>
+        <p:cNvPr id="1" name=""/>
+        <p:cNvGrpSpPr/>
+        <p:nvPr/>
+      </p:nvGrpSpPr>
+      <p:grpSpPr>
+        <a:xfrm>
+          <a:off x="0" y="0"/>
+          <a:ext cx="0" cy="0"/>
+          <a:chOff x="0" y="0"/>
+          <a:chExt cx="0" cy="0"/>
+        </a:xfrm>
+      </p:grpSpPr>
+      <p:sp useBgFill="1">
+        <p:nvSpPr>
+          <p:cNvPr id="8" name="Rectangle 7">
+            <a:extLst>
+              <a:ext uri="{FF2B5EF4-FFF2-40B4-BE49-F238E27FC236}">
+                <a16:creationId xmlns:a16="http://schemas.microsoft.com/office/drawing/2014/main" id="{943CAA20-3569-4189-9E48-239A229A86CA}"/>
+              </a:ext>
+              <a:ext uri="{C183D7F6-B498-43B3-948B-1728B52AA6E4}">
+                <adec:decorative xmlns:adec="http://schemas.microsoft.com/office/drawing/2017/decorative" val="1"/>
+              </a:ext>
+            </a:extLst>
+          </p:cNvPr>
+          <p:cNvSpPr>
+            <a:spLocks noGrp="1" noRot="1" noChangeAspect="1" noMove="1" noResize="1" noEditPoints="1" noAdjustHandles="1" noChangeArrowheads="1" noChangeShapeType="1" noTextEdit="1"/>
+          </p:cNvSpPr>
+          <p:nvPr>
+            <p:extLst>
+              <p:ext uri="{386F3935-93C4-4BCD-93E2-E3B085C9AB24}">
+                <p16:designElem xmlns:p16="http://schemas.microsoft.com/office/powerpoint/2015/main" val="1"/>
+              </p:ext>
+            </p:extLst>
+          </p:nvPr>
+        </p:nvSpPr>
+        <p:spPr>
+          <a:xfrm>
+            <a:off x="0" y="0"/>
+            <a:ext cx="12188952" cy="6858000"/>
+          </a:xfrm>
+          <a:prstGeom prst="rect">
+            <a:avLst/>
+          </a:prstGeom>
+          <a:ln>
+            <a:noFill/>
+          </a:ln>
+        </p:spPr>
+        <p:style>
+          <a:lnRef idx="2">
+            <a:schemeClr val="accent1">
+              <a:shade val="50000"/>
+            </a:schemeClr>
+          </a:lnRef>
+          <a:fillRef idx="1">
+            <a:schemeClr val="accent1"/>
+          </a:fillRef>
+          <a:effectRef idx="0">
+            <a:schemeClr val="accent1"/>
+          </a:effectRef>
+          <a:fontRef idx="minor">
+            <a:schemeClr val="lt1"/>
+          </a:fontRef>
+        </p:style>
+        <p:txBody>
+          <a:bodyPr rtlCol="0" anchor="ctr"/>
+          <a:lstStyle/>
+          <a:p>
+            <a:pPr marL="0" marR="0" lvl="0" indent="0" algn="ctr" defTabSz="914400" rtl="0" eaLnBrk="1" fontAlgn="auto" latinLnBrk="0" hangingPunct="1">
+              <a:lnSpc>
+                <a:spcPct val="100000"/>
+              </a:lnSpc>
+              <a:spcBef>
+                <a:spcPts val="0"/>
+              </a:spcBef>
+              <a:spcAft>
+                <a:spcPts val="0"/>
+              </a:spcAft>
+              <a:buClrTx/>
+              <a:buSzTx/>
+              <a:buFontTx/>
+              <a:buNone/>
+              <a:tabLst/>
+              <a:defRPr/>
+            </a:pPr>
+            <a:endParaRPr kumimoji="0" lang="en-US" sz="1800" b="0" i="0" u="none" strike="noStrike" kern="1200" cap="none" spc="0" normalizeH="0" baseline="0" noProof="0">
+              <a:ln>
+                <a:noFill/>
+              </a:ln>
+              <a:solidFill>
+                <a:prstClr val="white"/>
+              </a:solidFill>
+              <a:effectLst/>
+              <a:uLnTx/>
+              <a:uFillTx/>
+              <a:latin typeface="Aptos" panose="02110004020202020204"/>
+              <a:ea typeface="+mn-ea"/>
+              <a:cs typeface="+mn-cs"/>
+            </a:endParaRPr>
+          </a:p>
+        </p:txBody>
+      </p:sp>
+      <p:sp>
+        <p:nvSpPr>
+          <p:cNvPr id="2" name="Title 1">
+            <a:extLst>
+              <a:ext uri="{FF2B5EF4-FFF2-40B4-BE49-F238E27FC236}">
+                <a16:creationId xmlns:a16="http://schemas.microsoft.com/office/drawing/2014/main" id="{C2B108BA-CE66-2908-88CD-284D3F55490C}"/>
+              </a:ext>
+            </a:extLst>
+          </p:cNvPr>
+          <p:cNvSpPr>
+            <a:spLocks noGrp="1"/>
+          </p:cNvSpPr>
+          <p:nvPr>
+            <p:ph type="title"/>
+          </p:nvPr>
+        </p:nvSpPr>
+        <p:spPr>
+          <a:xfrm>
+            <a:off x="838200" y="451381"/>
+            <a:ext cx="10512552" cy="4066540"/>
+          </a:xfrm>
+        </p:spPr>
+        <p:txBody>
+          <a:bodyPr vert="horz" lIns="91440" tIns="45720" rIns="91440" bIns="45720" rtlCol="0" anchor="b">
+            <a:normAutofit/>
+          </a:bodyPr>
+          <a:lstStyle/>
+          <a:p>
+            <a:r>
+              <a:rPr lang="en-US" sz="6600" kern="1200">
+                <a:solidFill>
+                  <a:schemeClr val="tx1"/>
+                </a:solidFill>
+                <a:latin typeface="+mj-lt"/>
+                <a:ea typeface="+mj-ea"/>
+                <a:cs typeface="+mj-cs"/>
+              </a:rPr>
+              <a:t>DEMO</a:t>
+            </a:r>
+          </a:p>
+        </p:txBody>
+      </p:sp>
+      <p:sp>
+        <p:nvSpPr>
+          <p:cNvPr id="3" name="Content Placeholder 2">
+            <a:extLst>
+              <a:ext uri="{FF2B5EF4-FFF2-40B4-BE49-F238E27FC236}">
+                <a16:creationId xmlns:a16="http://schemas.microsoft.com/office/drawing/2014/main" id="{ABE0EBD9-543C-DF01-01FB-128713202535}"/>
+              </a:ext>
+            </a:extLst>
+          </p:cNvPr>
+          <p:cNvSpPr>
+            <a:spLocks noGrp="1"/>
+          </p:cNvSpPr>
+          <p:nvPr>
+            <p:ph idx="1"/>
+          </p:nvPr>
+        </p:nvSpPr>
+        <p:spPr>
+          <a:xfrm>
+            <a:off x="838199" y="4983276"/>
+            <a:ext cx="10512552" cy="1126680"/>
+          </a:xfrm>
+        </p:spPr>
+        <p:txBody>
+          <a:bodyPr vert="horz" lIns="91440" tIns="45720" rIns="91440" bIns="45720" rtlCol="0">
+            <a:normAutofit/>
+          </a:bodyPr>
+          <a:lstStyle/>
+          <a:p>
+            <a:pPr marL="0" indent="0">
+              <a:buNone/>
+            </a:pPr>
+            <a:r>
+              <a:rPr lang="en-US" sz="2400" dirty="0"/>
+              <a:t>Advanced Observability Concepts</a:t>
+            </a:r>
+            <a:endParaRPr lang="en-US" sz="2400" kern="1200" dirty="0">
+              <a:solidFill>
+                <a:schemeClr val="tx1"/>
+              </a:solidFill>
+              <a:latin typeface="+mn-lt"/>
+              <a:ea typeface="+mn-ea"/>
+              <a:cs typeface="+mn-cs"/>
+            </a:endParaRPr>
+          </a:p>
+        </p:txBody>
+      </p:sp>
+      <p:sp>
+        <p:nvSpPr>
+          <p:cNvPr id="10" name="sketch line">
+            <a:extLst>
+              <a:ext uri="{FF2B5EF4-FFF2-40B4-BE49-F238E27FC236}">
+                <a16:creationId xmlns:a16="http://schemas.microsoft.com/office/drawing/2014/main" id="{DA542B6D-E775-4832-91DC-2D20F857813A}"/>
+              </a:ext>
+              <a:ext uri="{C183D7F6-B498-43B3-948B-1728B52AA6E4}">
+                <adec:decorative xmlns:adec="http://schemas.microsoft.com/office/drawing/2017/decorative" val="1"/>
+              </a:ext>
+            </a:extLst>
+          </p:cNvPr>
+          <p:cNvSpPr>
+            <a:spLocks noGrp="1" noRot="1" noChangeAspect="1" noMove="1" noResize="1" noEditPoints="1" noAdjustHandles="1" noChangeArrowheads="1" noChangeShapeType="1" noTextEdit="1"/>
+          </p:cNvSpPr>
+          <p:nvPr>
+            <p:extLst>
+              <p:ext uri="{386F3935-93C4-4BCD-93E2-E3B085C9AB24}">
+                <p16:designElem xmlns:p16="http://schemas.microsoft.com/office/powerpoint/2015/main" val="1"/>
+              </p:ext>
+            </p:extLst>
+          </p:nvPr>
+        </p:nvSpPr>
+        <p:spPr>
+          <a:xfrm>
+            <a:off x="838200" y="4718595"/>
+            <a:ext cx="5410200" cy="18288"/>
+          </a:xfrm>
+          <a:custGeom>
+            <a:avLst/>
+            <a:gdLst>
+              <a:gd name="csX0" fmla="*/ 0 w 5410200"/>
+              <a:gd name="csY0" fmla="*/ 0 h 18288"/>
+              <a:gd name="csX1" fmla="*/ 568071 w 5410200"/>
+              <a:gd name="csY1" fmla="*/ 0 h 18288"/>
+              <a:gd name="csX2" fmla="*/ 1298448 w 5410200"/>
+              <a:gd name="csY2" fmla="*/ 0 h 18288"/>
+              <a:gd name="csX3" fmla="*/ 1920621 w 5410200"/>
+              <a:gd name="csY3" fmla="*/ 0 h 18288"/>
+              <a:gd name="csX4" fmla="*/ 2488692 w 5410200"/>
+              <a:gd name="csY4" fmla="*/ 0 h 18288"/>
+              <a:gd name="csX5" fmla="*/ 3219069 w 5410200"/>
+              <a:gd name="csY5" fmla="*/ 0 h 18288"/>
+              <a:gd name="csX6" fmla="*/ 3895344 w 5410200"/>
+              <a:gd name="csY6" fmla="*/ 0 h 18288"/>
+              <a:gd name="csX7" fmla="*/ 4571619 w 5410200"/>
+              <a:gd name="csY7" fmla="*/ 0 h 18288"/>
+              <a:gd name="csX8" fmla="*/ 5410200 w 5410200"/>
+              <a:gd name="csY8" fmla="*/ 0 h 18288"/>
+              <a:gd name="csX9" fmla="*/ 5410200 w 5410200"/>
+              <a:gd name="csY9" fmla="*/ 18288 h 18288"/>
+              <a:gd name="csX10" fmla="*/ 4842129 w 5410200"/>
+              <a:gd name="csY10" fmla="*/ 18288 h 18288"/>
+              <a:gd name="csX11" fmla="*/ 4328160 w 5410200"/>
+              <a:gd name="csY11" fmla="*/ 18288 h 18288"/>
+              <a:gd name="csX12" fmla="*/ 3597783 w 5410200"/>
+              <a:gd name="csY12" fmla="*/ 18288 h 18288"/>
+              <a:gd name="csX13" fmla="*/ 3029712 w 5410200"/>
+              <a:gd name="csY13" fmla="*/ 18288 h 18288"/>
+              <a:gd name="csX14" fmla="*/ 2299335 w 5410200"/>
+              <a:gd name="csY14" fmla="*/ 18288 h 18288"/>
+              <a:gd name="csX15" fmla="*/ 1514856 w 5410200"/>
+              <a:gd name="csY15" fmla="*/ 18288 h 18288"/>
+              <a:gd name="csX16" fmla="*/ 892683 w 5410200"/>
+              <a:gd name="csY16" fmla="*/ 18288 h 18288"/>
+              <a:gd name="csX17" fmla="*/ 0 w 5410200"/>
+              <a:gd name="csY17" fmla="*/ 18288 h 18288"/>
+              <a:gd name="csX18" fmla="*/ 0 w 5410200"/>
+              <a:gd name="csY18" fmla="*/ 0 h 18288"/>
+            </a:gdLst>
+            <a:ahLst/>
+            <a:cxnLst>
+              <a:cxn ang="0">
+                <a:pos x="csX0" y="csY0"/>
+              </a:cxn>
+              <a:cxn ang="0">
+                <a:pos x="csX1" y="csY1"/>
+              </a:cxn>
+              <a:cxn ang="0">
+                <a:pos x="csX2" y="csY2"/>
+              </a:cxn>
+              <a:cxn ang="0">
+                <a:pos x="csX3" y="csY3"/>
+              </a:cxn>
+              <a:cxn ang="0">
+                <a:pos x="csX4" y="csY4"/>
+              </a:cxn>
+              <a:cxn ang="0">
+                <a:pos x="csX5" y="csY5"/>
+              </a:cxn>
+              <a:cxn ang="0">
+                <a:pos x="csX6" y="csY6"/>
+              </a:cxn>
+              <a:cxn ang="0">
+                <a:pos x="csX7" y="csY7"/>
+              </a:cxn>
+              <a:cxn ang="0">
+                <a:pos x="csX8" y="csY8"/>
+              </a:cxn>
+              <a:cxn ang="0">
+                <a:pos x="csX9" y="csY9"/>
+              </a:cxn>
+              <a:cxn ang="0">
+                <a:pos x="csX10" y="csY10"/>
+              </a:cxn>
+              <a:cxn ang="0">
+                <a:pos x="csX11" y="csY11"/>
+              </a:cxn>
+              <a:cxn ang="0">
+                <a:pos x="csX12" y="csY12"/>
+              </a:cxn>
+              <a:cxn ang="0">
+                <a:pos x="csX13" y="csY13"/>
+              </a:cxn>
+              <a:cxn ang="0">
+                <a:pos x="csX14" y="csY14"/>
+              </a:cxn>
+              <a:cxn ang="0">
+                <a:pos x="csX15" y="csY15"/>
+              </a:cxn>
+              <a:cxn ang="0">
+                <a:pos x="csX16" y="csY16"/>
+              </a:cxn>
+              <a:cxn ang="0">
+                <a:pos x="csX17" y="csY17"/>
+              </a:cxn>
+              <a:cxn ang="0">
+                <a:pos x="csX18" y="csY18"/>
+              </a:cxn>
+            </a:cxnLst>
+            <a:rect l="l" t="t" r="r" b="b"/>
+            <a:pathLst>
+              <a:path w="5410200" h="18288" fill="none" extrusionOk="0">
+                <a:moveTo>
+                  <a:pt x="0" y="0"/>
+                </a:moveTo>
+                <a:cubicBezTo>
+                  <a:pt x="163050" y="-18707"/>
+                  <a:pt x="319321" y="-16364"/>
+                  <a:pt x="568071" y="0"/>
+                </a:cubicBezTo>
+                <a:cubicBezTo>
+                  <a:pt x="816821" y="16364"/>
+                  <a:pt x="1013224" y="-7268"/>
+                  <a:pt x="1298448" y="0"/>
+                </a:cubicBezTo>
+                <a:cubicBezTo>
+                  <a:pt x="1583672" y="7268"/>
+                  <a:pt x="1631711" y="-3367"/>
+                  <a:pt x="1920621" y="0"/>
+                </a:cubicBezTo>
+                <a:cubicBezTo>
+                  <a:pt x="2209531" y="3367"/>
+                  <a:pt x="2364420" y="-19184"/>
+                  <a:pt x="2488692" y="0"/>
+                </a:cubicBezTo>
+                <a:cubicBezTo>
+                  <a:pt x="2612964" y="19184"/>
+                  <a:pt x="3023298" y="-34627"/>
+                  <a:pt x="3219069" y="0"/>
+                </a:cubicBezTo>
+                <a:cubicBezTo>
+                  <a:pt x="3414840" y="34627"/>
+                  <a:pt x="3656810" y="24043"/>
+                  <a:pt x="3895344" y="0"/>
+                </a:cubicBezTo>
+                <a:cubicBezTo>
+                  <a:pt x="4133879" y="-24043"/>
+                  <a:pt x="4393984" y="-19577"/>
+                  <a:pt x="4571619" y="0"/>
+                </a:cubicBezTo>
+                <a:cubicBezTo>
+                  <a:pt x="4749255" y="19577"/>
+                  <a:pt x="5179928" y="-6281"/>
+                  <a:pt x="5410200" y="0"/>
+                </a:cubicBezTo>
+                <a:cubicBezTo>
+                  <a:pt x="5410730" y="6954"/>
+                  <a:pt x="5410934" y="12839"/>
+                  <a:pt x="5410200" y="18288"/>
+                </a:cubicBezTo>
+                <a:cubicBezTo>
+                  <a:pt x="5139060" y="6751"/>
+                  <a:pt x="5121593" y="31035"/>
+                  <a:pt x="4842129" y="18288"/>
+                </a:cubicBezTo>
+                <a:cubicBezTo>
+                  <a:pt x="4562665" y="5541"/>
+                  <a:pt x="4448273" y="9487"/>
+                  <a:pt x="4328160" y="18288"/>
+                </a:cubicBezTo>
+                <a:cubicBezTo>
+                  <a:pt x="4208047" y="27089"/>
+                  <a:pt x="3760936" y="22567"/>
+                  <a:pt x="3597783" y="18288"/>
+                </a:cubicBezTo>
+                <a:cubicBezTo>
+                  <a:pt x="3434630" y="14009"/>
+                  <a:pt x="3299718" y="33213"/>
+                  <a:pt x="3029712" y="18288"/>
+                </a:cubicBezTo>
+                <a:cubicBezTo>
+                  <a:pt x="2759706" y="3363"/>
+                  <a:pt x="2640159" y="27394"/>
+                  <a:pt x="2299335" y="18288"/>
+                </a:cubicBezTo>
+                <a:cubicBezTo>
+                  <a:pt x="1958511" y="9182"/>
+                  <a:pt x="1801186" y="28985"/>
+                  <a:pt x="1514856" y="18288"/>
+                </a:cubicBezTo>
+                <a:cubicBezTo>
+                  <a:pt x="1228526" y="7591"/>
+                  <a:pt x="1063509" y="-5305"/>
+                  <a:pt x="892683" y="18288"/>
+                </a:cubicBezTo>
+                <a:cubicBezTo>
+                  <a:pt x="721857" y="41881"/>
+                  <a:pt x="186945" y="-20897"/>
+                  <a:pt x="0" y="18288"/>
+                </a:cubicBezTo>
+                <a:cubicBezTo>
+                  <a:pt x="-570" y="9279"/>
+                  <a:pt x="132" y="5100"/>
+                  <a:pt x="0" y="0"/>
+                </a:cubicBezTo>
+                <a:close/>
+              </a:path>
+              <a:path w="5410200" h="18288" stroke="0" extrusionOk="0">
+                <a:moveTo>
+                  <a:pt x="0" y="0"/>
+                </a:moveTo>
+                <a:cubicBezTo>
+                  <a:pt x="285096" y="-4925"/>
+                  <a:pt x="376456" y="22268"/>
+                  <a:pt x="622173" y="0"/>
+                </a:cubicBezTo>
+                <a:cubicBezTo>
+                  <a:pt x="867890" y="-22268"/>
+                  <a:pt x="1031392" y="7228"/>
+                  <a:pt x="1136142" y="0"/>
+                </a:cubicBezTo>
+                <a:cubicBezTo>
+                  <a:pt x="1240892" y="-7228"/>
+                  <a:pt x="1561853" y="9877"/>
+                  <a:pt x="1920621" y="0"/>
+                </a:cubicBezTo>
+                <a:cubicBezTo>
+                  <a:pt x="2279389" y="-9877"/>
+                  <a:pt x="2367255" y="19546"/>
+                  <a:pt x="2542794" y="0"/>
+                </a:cubicBezTo>
+                <a:cubicBezTo>
+                  <a:pt x="2718333" y="-19546"/>
+                  <a:pt x="2866732" y="-22226"/>
+                  <a:pt x="3164967" y="0"/>
+                </a:cubicBezTo>
+                <a:cubicBezTo>
+                  <a:pt x="3463202" y="22226"/>
+                  <a:pt x="3568055" y="-2765"/>
+                  <a:pt x="3949446" y="0"/>
+                </a:cubicBezTo>
+                <a:cubicBezTo>
+                  <a:pt x="4330837" y="2765"/>
+                  <a:pt x="4287895" y="10557"/>
+                  <a:pt x="4517517" y="0"/>
+                </a:cubicBezTo>
+                <a:cubicBezTo>
+                  <a:pt x="4747139" y="-10557"/>
+                  <a:pt x="5149588" y="8716"/>
+                  <a:pt x="5410200" y="0"/>
+                </a:cubicBezTo>
+                <a:cubicBezTo>
+                  <a:pt x="5409517" y="5414"/>
+                  <a:pt x="5409480" y="12510"/>
+                  <a:pt x="5410200" y="18288"/>
+                </a:cubicBezTo>
+                <a:cubicBezTo>
+                  <a:pt x="5163327" y="41494"/>
+                  <a:pt x="5008749" y="10693"/>
+                  <a:pt x="4842129" y="18288"/>
+                </a:cubicBezTo>
+                <a:cubicBezTo>
+                  <a:pt x="4675509" y="25883"/>
+                  <a:pt x="4433401" y="-615"/>
+                  <a:pt x="4165854" y="18288"/>
+                </a:cubicBezTo>
+                <a:cubicBezTo>
+                  <a:pt x="3898308" y="37191"/>
+                  <a:pt x="3809032" y="-8710"/>
+                  <a:pt x="3543681" y="18288"/>
+                </a:cubicBezTo>
+                <a:cubicBezTo>
+                  <a:pt x="3278330" y="45286"/>
+                  <a:pt x="3073876" y="-15917"/>
+                  <a:pt x="2759202" y="18288"/>
+                </a:cubicBezTo>
+                <a:cubicBezTo>
+                  <a:pt x="2444528" y="52493"/>
+                  <a:pt x="2204144" y="3372"/>
+                  <a:pt x="1974723" y="18288"/>
+                </a:cubicBezTo>
+                <a:cubicBezTo>
+                  <a:pt x="1745302" y="33204"/>
+                  <a:pt x="1602335" y="31490"/>
+                  <a:pt x="1406652" y="18288"/>
+                </a:cubicBezTo>
+                <a:cubicBezTo>
+                  <a:pt x="1210969" y="5086"/>
+                  <a:pt x="923948" y="3161"/>
+                  <a:pt x="730377" y="18288"/>
+                </a:cubicBezTo>
+                <a:cubicBezTo>
+                  <a:pt x="536806" y="33415"/>
+                  <a:pt x="336496" y="-141"/>
+                  <a:pt x="0" y="18288"/>
+                </a:cubicBezTo>
+                <a:cubicBezTo>
+                  <a:pt x="-306" y="11061"/>
+                  <a:pt x="-655" y="7751"/>
+                  <a:pt x="0" y="0"/>
+                </a:cubicBezTo>
+                <a:close/>
+              </a:path>
+            </a:pathLst>
+          </a:custGeom>
+          <a:solidFill>
+            <a:schemeClr val="accent2"/>
+          </a:solidFill>
+          <a:ln w="41275" cap="rnd">
+            <a:solidFill>
+              <a:schemeClr val="accent2"/>
+            </a:solidFill>
+            <a:round/>
+            <a:extLst>
+              <a:ext uri="{C807C97D-BFC1-408E-A445-0C87EB9F89A2}">
+                <ask:lineSketchStyleProps xmlns:ask="http://schemas.microsoft.com/office/drawing/2018/sketchyshapes" sd="1219033472">
+                  <a:prstGeom prst="rect">
+                    <a:avLst/>
+                  </a:prstGeom>
+                  <ask:type>
+                    <ask:lineSketchFreehand/>
+                  </ask:type>
+                </ask:lineSketchStyleProps>
+              </a:ext>
+            </a:extLst>
+          </a:ln>
+        </p:spPr>
+        <p:style>
+          <a:lnRef idx="2">
+            <a:schemeClr val="accent1">
+              <a:shade val="50000"/>
+            </a:schemeClr>
+          </a:lnRef>
+          <a:fillRef idx="1">
+            <a:schemeClr val="accent1"/>
+          </a:fillRef>
+          <a:effectRef idx="0">
+            <a:schemeClr val="accent1"/>
+          </a:effectRef>
+          <a:fontRef idx="minor">
+            <a:schemeClr val="lt1"/>
+          </a:fontRef>
+        </p:style>
+        <p:txBody>
+          <a:bodyPr rtlCol="0" anchor="ctr"/>
+          <a:lstStyle/>
+          <a:p>
+            <a:pPr marL="0" marR="0" lvl="0" indent="0" algn="ctr" defTabSz="914400" rtl="0" eaLnBrk="1" fontAlgn="auto" latinLnBrk="0" hangingPunct="1">
+              <a:lnSpc>
+                <a:spcPct val="100000"/>
+              </a:lnSpc>
+              <a:spcBef>
+                <a:spcPts val="0"/>
+              </a:spcBef>
+              <a:spcAft>
+                <a:spcPts val="0"/>
+              </a:spcAft>
+              <a:buClrTx/>
+              <a:buSzTx/>
+              <a:buFontTx/>
+              <a:buNone/>
+              <a:tabLst/>
+              <a:defRPr/>
+            </a:pPr>
+            <a:endParaRPr kumimoji="0" lang="en-US" sz="1800" b="0" i="0" u="none" strike="noStrike" kern="1200" cap="none" spc="0" normalizeH="0" baseline="0" noProof="0">
+              <a:ln>
+                <a:noFill/>
+              </a:ln>
+              <a:solidFill>
+                <a:prstClr val="white"/>
+              </a:solidFill>
+              <a:effectLst/>
+              <a:uLnTx/>
+              <a:uFillTx/>
+              <a:latin typeface="Aptos" panose="02110004020202020204"/>
+              <a:ea typeface="+mn-ea"/>
+              <a:cs typeface="+mn-cs"/>
+            </a:endParaRPr>
+          </a:p>
+        </p:txBody>
+      </p:sp>
+    </p:spTree>
+    <p:extLst>
+      <p:ext uri="{BB962C8B-B14F-4D97-AF65-F5344CB8AC3E}">
+        <p14:creationId xmlns:p14="http://schemas.microsoft.com/office/powerpoint/2010/main" val="2540744057"/>
       </p:ext>
     </p:extLst>
   </p:cSld>

</xml_diff>